<commit_message>
prezentace vytvoření výpisu příspěvků
</commit_message>
<xml_diff>
--- a/05-sql-databaze/05-aplikace-nastenka/prezentace-postup-vyvoje-nastenka.pptx
+++ b/05-sql-databaze/05-aplikace-nastenka/prezentace-postup-vyvoje-nastenka.pptx
@@ -26,6 +26,28 @@
     <p:sldId id="273" r:id="rId20"/>
     <p:sldId id="274" r:id="rId21"/>
     <p:sldId id="259" r:id="rId22"/>
+    <p:sldId id="278" r:id="rId23"/>
+    <p:sldId id="279" r:id="rId24"/>
+    <p:sldId id="280" r:id="rId25"/>
+    <p:sldId id="281" r:id="rId26"/>
+    <p:sldId id="282" r:id="rId27"/>
+    <p:sldId id="283" r:id="rId28"/>
+    <p:sldId id="284" r:id="rId29"/>
+    <p:sldId id="285" r:id="rId30"/>
+    <p:sldId id="286" r:id="rId31"/>
+    <p:sldId id="287" r:id="rId32"/>
+    <p:sldId id="288" r:id="rId33"/>
+    <p:sldId id="290" r:id="rId34"/>
+    <p:sldId id="289" r:id="rId35"/>
+    <p:sldId id="292" r:id="rId36"/>
+    <p:sldId id="291" r:id="rId37"/>
+    <p:sldId id="293" r:id="rId38"/>
+    <p:sldId id="294" r:id="rId39"/>
+    <p:sldId id="295" r:id="rId40"/>
+    <p:sldId id="296" r:id="rId41"/>
+    <p:sldId id="298" r:id="rId42"/>
+    <p:sldId id="299" r:id="rId43"/>
+    <p:sldId id="300" r:id="rId44"/>
   </p:sldIdLst>
   <p:sldSz cx="12192000" cy="6858000"/>
   <p:notesSz cx="6858000" cy="9144000"/>
@@ -5709,6 +5731,1453 @@
 </p:sld>
 </file>
 
+<file path=ppt/slides/slide22.xml><?xml version="1.0" encoding="utf-8"?>
+<p:sld xmlns:a="http://schemas.openxmlformats.org/drawingml/2006/main" xmlns:r="http://schemas.openxmlformats.org/officeDocument/2006/relationships" xmlns:p="http://schemas.openxmlformats.org/presentationml/2006/main">
+  <p:cSld>
+    <p:spTree>
+      <p:nvGrpSpPr>
+        <p:cNvPr id="1" name=""/>
+        <p:cNvGrpSpPr/>
+        <p:nvPr/>
+      </p:nvGrpSpPr>
+      <p:grpSpPr>
+        <a:xfrm>
+          <a:off x="0" y="0"/>
+          <a:ext cx="0" cy="0"/>
+          <a:chOff x="0" y="0"/>
+          <a:chExt cx="0" cy="0"/>
+        </a:xfrm>
+      </p:grpSpPr>
+      <p:sp>
+        <p:nvSpPr>
+          <p:cNvPr id="2" name="Nadpis 1">
+            <a:extLst>
+              <a:ext uri="{FF2B5EF4-FFF2-40B4-BE49-F238E27FC236}">
+                <a16:creationId xmlns:a16="http://schemas.microsoft.com/office/drawing/2014/main" id="{4D20E2F8-2F24-40E0-A016-705E27B8DBD3}"/>
+              </a:ext>
+            </a:extLst>
+          </p:cNvPr>
+          <p:cNvSpPr>
+            <a:spLocks noGrp="1"/>
+          </p:cNvSpPr>
+          <p:nvPr>
+            <p:ph type="title"/>
+          </p:nvPr>
+        </p:nvSpPr>
+        <p:spPr/>
+        <p:txBody>
+          <a:bodyPr/>
+          <a:lstStyle/>
+          <a:p>
+            <a:endParaRPr lang="en-US"/>
+          </a:p>
+        </p:txBody>
+      </p:sp>
+      <p:sp>
+        <p:nvSpPr>
+          <p:cNvPr id="3" name="Zástupný obsah 2">
+            <a:extLst>
+              <a:ext uri="{FF2B5EF4-FFF2-40B4-BE49-F238E27FC236}">
+                <a16:creationId xmlns:a16="http://schemas.microsoft.com/office/drawing/2014/main" id="{EDBE85FD-FF3B-40B3-B400-F9EC3F305CA1}"/>
+              </a:ext>
+            </a:extLst>
+          </p:cNvPr>
+          <p:cNvSpPr>
+            <a:spLocks noGrp="1"/>
+          </p:cNvSpPr>
+          <p:nvPr>
+            <p:ph idx="1"/>
+          </p:nvPr>
+        </p:nvSpPr>
+        <p:spPr/>
+        <p:txBody>
+          <a:bodyPr/>
+          <a:lstStyle/>
+          <a:p>
+            <a:endParaRPr lang="en-US"/>
+          </a:p>
+        </p:txBody>
+      </p:sp>
+      <p:pic>
+        <p:nvPicPr>
+          <p:cNvPr id="4" name="Obrázek 3">
+            <a:extLst>
+              <a:ext uri="{FF2B5EF4-FFF2-40B4-BE49-F238E27FC236}">
+                <a16:creationId xmlns:a16="http://schemas.microsoft.com/office/drawing/2014/main" id="{84397119-0F6B-4609-AA67-DD8CBEC2C87B}"/>
+              </a:ext>
+            </a:extLst>
+          </p:cNvPr>
+          <p:cNvPicPr>
+            <a:picLocks noChangeAspect="1"/>
+          </p:cNvPicPr>
+          <p:nvPr/>
+        </p:nvPicPr>
+        <p:blipFill>
+          <a:blip r:embed="rId2"/>
+          <a:stretch>
+            <a:fillRect/>
+          </a:stretch>
+        </p:blipFill>
+        <p:spPr>
+          <a:xfrm>
+            <a:off x="0" y="180180"/>
+            <a:ext cx="12192000" cy="6497640"/>
+          </a:xfrm>
+          <a:prstGeom prst="rect">
+            <a:avLst/>
+          </a:prstGeom>
+        </p:spPr>
+      </p:pic>
+      <p:sp>
+        <p:nvSpPr>
+          <p:cNvPr id="5" name="TextovéPole 4">
+            <a:extLst>
+              <a:ext uri="{FF2B5EF4-FFF2-40B4-BE49-F238E27FC236}">
+                <a16:creationId xmlns:a16="http://schemas.microsoft.com/office/drawing/2014/main" id="{75E57F71-56D4-4751-B50A-F51ED1F6C38F}"/>
+              </a:ext>
+            </a:extLst>
+          </p:cNvPr>
+          <p:cNvSpPr txBox="1"/>
+          <p:nvPr/>
+        </p:nvSpPr>
+        <p:spPr>
+          <a:xfrm>
+            <a:off x="4731026" y="2564747"/>
+            <a:ext cx="7298635" cy="2308324"/>
+          </a:xfrm>
+          <a:prstGeom prst="rect">
+            <a:avLst/>
+          </a:prstGeom>
+        </p:spPr>
+        <p:style>
+          <a:lnRef idx="2">
+            <a:schemeClr val="accent2">
+              <a:shade val="50000"/>
+            </a:schemeClr>
+          </a:lnRef>
+          <a:fillRef idx="1">
+            <a:schemeClr val="accent2"/>
+          </a:fillRef>
+          <a:effectRef idx="0">
+            <a:schemeClr val="accent2"/>
+          </a:effectRef>
+          <a:fontRef idx="minor">
+            <a:schemeClr val="lt1"/>
+          </a:fontRef>
+        </p:style>
+        <p:txBody>
+          <a:bodyPr wrap="square" rtlCol="0">
+            <a:spAutoFit/>
+          </a:bodyPr>
+          <a:lstStyle/>
+          <a:p>
+            <a:r>
+              <a:rPr lang="cs-CZ" dirty="0"/>
+              <a:t>Tvorbu aplikace začneme vytvořením prázdného projektu, do kterého připravíme soubor s připojením k databázi.</a:t>
+            </a:r>
+          </a:p>
+          <a:p>
+            <a:endParaRPr lang="cs-CZ" dirty="0"/>
+          </a:p>
+          <a:p>
+            <a:r>
+              <a:rPr lang="cs-CZ" dirty="0"/>
+              <a:t>Soubory, které budeme chtít načítat z jiných souborů, si oddělíme do složky „</a:t>
+            </a:r>
+            <a:r>
+              <a:rPr lang="cs-CZ" dirty="0" err="1"/>
+              <a:t>inc</a:t>
+            </a:r>
+            <a:r>
+              <a:rPr lang="cs-CZ" dirty="0"/>
+              <a:t>“.</a:t>
+            </a:r>
+          </a:p>
+          <a:p>
+            <a:endParaRPr lang="cs-CZ" dirty="0"/>
+          </a:p>
+          <a:p>
+            <a:r>
+              <a:rPr lang="cs-CZ" dirty="0"/>
+              <a:t>V této složce tedy vytvoříme soubor „</a:t>
+            </a:r>
+            <a:r>
+              <a:rPr lang="cs-CZ" dirty="0" err="1"/>
+              <a:t>db.php</a:t>
+            </a:r>
+            <a:r>
+              <a:rPr lang="cs-CZ" dirty="0"/>
+              <a:t>“ a do něj nakopírujeme ukázku připojení k databázi pomocí PDO (kopírujeme z GitHubu předmětu).</a:t>
+            </a:r>
+          </a:p>
+        </p:txBody>
+      </p:sp>
+    </p:spTree>
+    <p:extLst>
+      <p:ext uri="{BB962C8B-B14F-4D97-AF65-F5344CB8AC3E}">
+        <p14:creationId xmlns:p14="http://schemas.microsoft.com/office/powerpoint/2010/main" val="2107524836"/>
+      </p:ext>
+    </p:extLst>
+  </p:cSld>
+  <p:clrMapOvr>
+    <a:masterClrMapping/>
+  </p:clrMapOvr>
+</p:sld>
+</file>
+
+<file path=ppt/slides/slide23.xml><?xml version="1.0" encoding="utf-8"?>
+<p:sld xmlns:a="http://schemas.openxmlformats.org/drawingml/2006/main" xmlns:r="http://schemas.openxmlformats.org/officeDocument/2006/relationships" xmlns:p="http://schemas.openxmlformats.org/presentationml/2006/main">
+  <p:cSld>
+    <p:spTree>
+      <p:nvGrpSpPr>
+        <p:cNvPr id="1" name=""/>
+        <p:cNvGrpSpPr/>
+        <p:nvPr/>
+      </p:nvGrpSpPr>
+      <p:grpSpPr>
+        <a:xfrm>
+          <a:off x="0" y="0"/>
+          <a:ext cx="0" cy="0"/>
+          <a:chOff x="0" y="0"/>
+          <a:chExt cx="0" cy="0"/>
+        </a:xfrm>
+      </p:grpSpPr>
+      <p:sp>
+        <p:nvSpPr>
+          <p:cNvPr id="2" name="Nadpis 1">
+            <a:extLst>
+              <a:ext uri="{FF2B5EF4-FFF2-40B4-BE49-F238E27FC236}">
+                <a16:creationId xmlns:a16="http://schemas.microsoft.com/office/drawing/2014/main" id="{9244BD1E-B997-45B6-A14D-B52DB5607FBC}"/>
+              </a:ext>
+            </a:extLst>
+          </p:cNvPr>
+          <p:cNvSpPr>
+            <a:spLocks noGrp="1"/>
+          </p:cNvSpPr>
+          <p:nvPr>
+            <p:ph type="title"/>
+          </p:nvPr>
+        </p:nvSpPr>
+        <p:spPr/>
+        <p:txBody>
+          <a:bodyPr/>
+          <a:lstStyle/>
+          <a:p>
+            <a:endParaRPr lang="en-US"/>
+          </a:p>
+        </p:txBody>
+      </p:sp>
+      <p:sp>
+        <p:nvSpPr>
+          <p:cNvPr id="3" name="Zástupný obsah 2">
+            <a:extLst>
+              <a:ext uri="{FF2B5EF4-FFF2-40B4-BE49-F238E27FC236}">
+                <a16:creationId xmlns:a16="http://schemas.microsoft.com/office/drawing/2014/main" id="{56BA020B-AAB1-43AF-A68A-89FEA4E1347D}"/>
+              </a:ext>
+            </a:extLst>
+          </p:cNvPr>
+          <p:cNvSpPr>
+            <a:spLocks noGrp="1"/>
+          </p:cNvSpPr>
+          <p:nvPr>
+            <p:ph idx="1"/>
+          </p:nvPr>
+        </p:nvSpPr>
+        <p:spPr/>
+        <p:txBody>
+          <a:bodyPr/>
+          <a:lstStyle/>
+          <a:p>
+            <a:endParaRPr lang="en-US"/>
+          </a:p>
+        </p:txBody>
+      </p:sp>
+      <p:pic>
+        <p:nvPicPr>
+          <p:cNvPr id="4" name="Obrázek 3">
+            <a:extLst>
+              <a:ext uri="{FF2B5EF4-FFF2-40B4-BE49-F238E27FC236}">
+                <a16:creationId xmlns:a16="http://schemas.microsoft.com/office/drawing/2014/main" id="{16411399-A060-4575-914E-8A77FA59D6CE}"/>
+              </a:ext>
+            </a:extLst>
+          </p:cNvPr>
+          <p:cNvPicPr>
+            <a:picLocks noChangeAspect="1"/>
+          </p:cNvPicPr>
+          <p:nvPr/>
+        </p:nvPicPr>
+        <p:blipFill>
+          <a:blip r:embed="rId2"/>
+          <a:stretch>
+            <a:fillRect/>
+          </a:stretch>
+        </p:blipFill>
+        <p:spPr>
+          <a:xfrm>
+            <a:off x="0" y="180180"/>
+            <a:ext cx="12192000" cy="6497640"/>
+          </a:xfrm>
+          <a:prstGeom prst="rect">
+            <a:avLst/>
+          </a:prstGeom>
+        </p:spPr>
+      </p:pic>
+      <p:sp>
+        <p:nvSpPr>
+          <p:cNvPr id="5" name="TextovéPole 4">
+            <a:extLst>
+              <a:ext uri="{FF2B5EF4-FFF2-40B4-BE49-F238E27FC236}">
+                <a16:creationId xmlns:a16="http://schemas.microsoft.com/office/drawing/2014/main" id="{565FB634-078E-4EC2-8DE7-63EAD29A5755}"/>
+              </a:ext>
+            </a:extLst>
+          </p:cNvPr>
+          <p:cNvSpPr txBox="1"/>
+          <p:nvPr/>
+        </p:nvSpPr>
+        <p:spPr>
+          <a:xfrm>
+            <a:off x="6593784" y="2985631"/>
+            <a:ext cx="5006837" cy="1754326"/>
+          </a:xfrm>
+          <a:prstGeom prst="rect">
+            <a:avLst/>
+          </a:prstGeom>
+        </p:spPr>
+        <p:style>
+          <a:lnRef idx="2">
+            <a:schemeClr val="accent2">
+              <a:shade val="50000"/>
+            </a:schemeClr>
+          </a:lnRef>
+          <a:fillRef idx="1">
+            <a:schemeClr val="accent2"/>
+          </a:fillRef>
+          <a:effectRef idx="0">
+            <a:schemeClr val="accent2"/>
+          </a:effectRef>
+          <a:fontRef idx="minor">
+            <a:schemeClr val="lt1"/>
+          </a:fontRef>
+        </p:style>
+        <p:txBody>
+          <a:bodyPr wrap="square" rtlCol="0">
+            <a:spAutoFit/>
+          </a:bodyPr>
+          <a:lstStyle/>
+          <a:p>
+            <a:r>
+              <a:rPr lang="cs-CZ" dirty="0"/>
+              <a:t>Dalším krokem bude vytvoření HTML stránky, která bude představovat základ naší nástěnky.</a:t>
+            </a:r>
+          </a:p>
+          <a:p>
+            <a:endParaRPr lang="cs-CZ" dirty="0"/>
+          </a:p>
+          <a:p>
+            <a:r>
+              <a:rPr lang="cs-CZ" dirty="0"/>
+              <a:t>Vytvoříme tedy soubor „</a:t>
+            </a:r>
+            <a:r>
+              <a:rPr lang="cs-CZ" dirty="0" err="1"/>
+              <a:t>index.php</a:t>
+            </a:r>
+            <a:r>
+              <a:rPr lang="cs-CZ" dirty="0"/>
+              <a:t>“, ve kterém bude prázdný HTML soubor, do kterého přidáme styly z </a:t>
+            </a:r>
+            <a:r>
+              <a:rPr lang="cs-CZ" dirty="0" err="1"/>
+              <a:t>bootstrapu</a:t>
+            </a:r>
+            <a:r>
+              <a:rPr lang="cs-CZ" dirty="0"/>
+              <a:t>.</a:t>
+            </a:r>
+          </a:p>
+        </p:txBody>
+      </p:sp>
+    </p:spTree>
+    <p:extLst>
+      <p:ext uri="{BB962C8B-B14F-4D97-AF65-F5344CB8AC3E}">
+        <p14:creationId xmlns:p14="http://schemas.microsoft.com/office/powerpoint/2010/main" val="883471496"/>
+      </p:ext>
+    </p:extLst>
+  </p:cSld>
+  <p:clrMapOvr>
+    <a:masterClrMapping/>
+  </p:clrMapOvr>
+</p:sld>
+</file>
+
+<file path=ppt/slides/slide24.xml><?xml version="1.0" encoding="utf-8"?>
+<p:sld xmlns:a="http://schemas.openxmlformats.org/drawingml/2006/main" xmlns:r="http://schemas.openxmlformats.org/officeDocument/2006/relationships" xmlns:p="http://schemas.openxmlformats.org/presentationml/2006/main">
+  <p:cSld>
+    <p:spTree>
+      <p:nvGrpSpPr>
+        <p:cNvPr id="1" name=""/>
+        <p:cNvGrpSpPr/>
+        <p:nvPr/>
+      </p:nvGrpSpPr>
+      <p:grpSpPr>
+        <a:xfrm>
+          <a:off x="0" y="0"/>
+          <a:ext cx="0" cy="0"/>
+          <a:chOff x="0" y="0"/>
+          <a:chExt cx="0" cy="0"/>
+        </a:xfrm>
+      </p:grpSpPr>
+      <p:sp>
+        <p:nvSpPr>
+          <p:cNvPr id="2" name="Nadpis 1">
+            <a:extLst>
+              <a:ext uri="{FF2B5EF4-FFF2-40B4-BE49-F238E27FC236}">
+                <a16:creationId xmlns:a16="http://schemas.microsoft.com/office/drawing/2014/main" id="{767CEC0D-F67C-4B37-BDA5-996BF5DCA4B4}"/>
+              </a:ext>
+            </a:extLst>
+          </p:cNvPr>
+          <p:cNvSpPr>
+            <a:spLocks noGrp="1"/>
+          </p:cNvSpPr>
+          <p:nvPr>
+            <p:ph type="title"/>
+          </p:nvPr>
+        </p:nvSpPr>
+        <p:spPr/>
+        <p:txBody>
+          <a:bodyPr/>
+          <a:lstStyle/>
+          <a:p>
+            <a:endParaRPr lang="en-US"/>
+          </a:p>
+        </p:txBody>
+      </p:sp>
+      <p:sp>
+        <p:nvSpPr>
+          <p:cNvPr id="3" name="Zástupný obsah 2">
+            <a:extLst>
+              <a:ext uri="{FF2B5EF4-FFF2-40B4-BE49-F238E27FC236}">
+                <a16:creationId xmlns:a16="http://schemas.microsoft.com/office/drawing/2014/main" id="{E60ACFC5-5E9C-4626-BC45-0FEDFDAB7436}"/>
+              </a:ext>
+            </a:extLst>
+          </p:cNvPr>
+          <p:cNvSpPr>
+            <a:spLocks noGrp="1"/>
+          </p:cNvSpPr>
+          <p:nvPr>
+            <p:ph idx="1"/>
+          </p:nvPr>
+        </p:nvSpPr>
+        <p:spPr/>
+        <p:txBody>
+          <a:bodyPr/>
+          <a:lstStyle/>
+          <a:p>
+            <a:endParaRPr lang="en-US"/>
+          </a:p>
+        </p:txBody>
+      </p:sp>
+      <p:pic>
+        <p:nvPicPr>
+          <p:cNvPr id="4" name="Obrázek 3">
+            <a:extLst>
+              <a:ext uri="{FF2B5EF4-FFF2-40B4-BE49-F238E27FC236}">
+                <a16:creationId xmlns:a16="http://schemas.microsoft.com/office/drawing/2014/main" id="{8F557749-0F1D-471E-8743-7692FC3F5569}"/>
+              </a:ext>
+            </a:extLst>
+          </p:cNvPr>
+          <p:cNvPicPr>
+            <a:picLocks noChangeAspect="1"/>
+          </p:cNvPicPr>
+          <p:nvPr/>
+        </p:nvPicPr>
+        <p:blipFill>
+          <a:blip r:embed="rId2"/>
+          <a:stretch>
+            <a:fillRect/>
+          </a:stretch>
+        </p:blipFill>
+        <p:spPr>
+          <a:xfrm>
+            <a:off x="0" y="180180"/>
+            <a:ext cx="12192000" cy="6497640"/>
+          </a:xfrm>
+          <a:prstGeom prst="rect">
+            <a:avLst/>
+          </a:prstGeom>
+        </p:spPr>
+      </p:pic>
+      <p:sp>
+        <p:nvSpPr>
+          <p:cNvPr id="5" name="TextovéPole 4">
+            <a:extLst>
+              <a:ext uri="{FF2B5EF4-FFF2-40B4-BE49-F238E27FC236}">
+                <a16:creationId xmlns:a16="http://schemas.microsoft.com/office/drawing/2014/main" id="{D4E0494D-6EC5-4BC0-B7D8-11B37F922F22}"/>
+              </a:ext>
+            </a:extLst>
+          </p:cNvPr>
+          <p:cNvSpPr txBox="1"/>
+          <p:nvPr/>
+        </p:nvSpPr>
+        <p:spPr>
+          <a:xfrm>
+            <a:off x="6766063" y="3608483"/>
+            <a:ext cx="5006837" cy="369332"/>
+          </a:xfrm>
+          <a:prstGeom prst="rect">
+            <a:avLst/>
+          </a:prstGeom>
+        </p:spPr>
+        <p:style>
+          <a:lnRef idx="2">
+            <a:schemeClr val="accent2">
+              <a:shade val="50000"/>
+            </a:schemeClr>
+          </a:lnRef>
+          <a:fillRef idx="1">
+            <a:schemeClr val="accent2"/>
+          </a:fillRef>
+          <a:effectRef idx="0">
+            <a:schemeClr val="accent2"/>
+          </a:effectRef>
+          <a:fontRef idx="minor">
+            <a:schemeClr val="lt1"/>
+          </a:fontRef>
+        </p:style>
+        <p:txBody>
+          <a:bodyPr wrap="square" rtlCol="0">
+            <a:spAutoFit/>
+          </a:bodyPr>
+          <a:lstStyle/>
+          <a:p>
+            <a:r>
+              <a:rPr lang="cs-CZ" dirty="0"/>
+              <a:t>Do nadpisy přidáme velmi jednoduchou hlavičku.</a:t>
+            </a:r>
+          </a:p>
+        </p:txBody>
+      </p:sp>
+    </p:spTree>
+    <p:extLst>
+      <p:ext uri="{BB962C8B-B14F-4D97-AF65-F5344CB8AC3E}">
+        <p14:creationId xmlns:p14="http://schemas.microsoft.com/office/powerpoint/2010/main" val="3267129638"/>
+      </p:ext>
+    </p:extLst>
+  </p:cSld>
+  <p:clrMapOvr>
+    <a:masterClrMapping/>
+  </p:clrMapOvr>
+</p:sld>
+</file>
+
+<file path=ppt/slides/slide25.xml><?xml version="1.0" encoding="utf-8"?>
+<p:sld xmlns:a="http://schemas.openxmlformats.org/drawingml/2006/main" xmlns:r="http://schemas.openxmlformats.org/officeDocument/2006/relationships" xmlns:p="http://schemas.openxmlformats.org/presentationml/2006/main">
+  <p:cSld>
+    <p:spTree>
+      <p:nvGrpSpPr>
+        <p:cNvPr id="1" name=""/>
+        <p:cNvGrpSpPr/>
+        <p:nvPr/>
+      </p:nvGrpSpPr>
+      <p:grpSpPr>
+        <a:xfrm>
+          <a:off x="0" y="0"/>
+          <a:ext cx="0" cy="0"/>
+          <a:chOff x="0" y="0"/>
+          <a:chExt cx="0" cy="0"/>
+        </a:xfrm>
+      </p:grpSpPr>
+      <p:sp>
+        <p:nvSpPr>
+          <p:cNvPr id="2" name="Nadpis 1">
+            <a:extLst>
+              <a:ext uri="{FF2B5EF4-FFF2-40B4-BE49-F238E27FC236}">
+                <a16:creationId xmlns:a16="http://schemas.microsoft.com/office/drawing/2014/main" id="{C5C00BF3-1293-4667-AC74-83026457A583}"/>
+              </a:ext>
+            </a:extLst>
+          </p:cNvPr>
+          <p:cNvSpPr>
+            <a:spLocks noGrp="1"/>
+          </p:cNvSpPr>
+          <p:nvPr>
+            <p:ph type="title"/>
+          </p:nvPr>
+        </p:nvSpPr>
+        <p:spPr/>
+        <p:txBody>
+          <a:bodyPr/>
+          <a:lstStyle/>
+          <a:p>
+            <a:endParaRPr lang="en-US"/>
+          </a:p>
+        </p:txBody>
+      </p:sp>
+      <p:sp>
+        <p:nvSpPr>
+          <p:cNvPr id="3" name="Zástupný obsah 2">
+            <a:extLst>
+              <a:ext uri="{FF2B5EF4-FFF2-40B4-BE49-F238E27FC236}">
+                <a16:creationId xmlns:a16="http://schemas.microsoft.com/office/drawing/2014/main" id="{D34145D4-EBDA-4704-9698-64CAA4B509DD}"/>
+              </a:ext>
+            </a:extLst>
+          </p:cNvPr>
+          <p:cNvSpPr>
+            <a:spLocks noGrp="1"/>
+          </p:cNvSpPr>
+          <p:nvPr>
+            <p:ph idx="1"/>
+          </p:nvPr>
+        </p:nvSpPr>
+        <p:spPr/>
+        <p:txBody>
+          <a:bodyPr/>
+          <a:lstStyle/>
+          <a:p>
+            <a:endParaRPr lang="en-US"/>
+          </a:p>
+        </p:txBody>
+      </p:sp>
+      <p:pic>
+        <p:nvPicPr>
+          <p:cNvPr id="4" name="Obrázek 3">
+            <a:extLst>
+              <a:ext uri="{FF2B5EF4-FFF2-40B4-BE49-F238E27FC236}">
+                <a16:creationId xmlns:a16="http://schemas.microsoft.com/office/drawing/2014/main" id="{F2A5455E-4107-4F31-BAE1-A5CC36C5CE8A}"/>
+              </a:ext>
+            </a:extLst>
+          </p:cNvPr>
+          <p:cNvPicPr>
+            <a:picLocks noChangeAspect="1"/>
+          </p:cNvPicPr>
+          <p:nvPr/>
+        </p:nvPicPr>
+        <p:blipFill>
+          <a:blip r:embed="rId2"/>
+          <a:stretch>
+            <a:fillRect/>
+          </a:stretch>
+        </p:blipFill>
+        <p:spPr>
+          <a:xfrm>
+            <a:off x="0" y="180180"/>
+            <a:ext cx="12192000" cy="6497640"/>
+          </a:xfrm>
+          <a:prstGeom prst="rect">
+            <a:avLst/>
+          </a:prstGeom>
+        </p:spPr>
+      </p:pic>
+      <p:sp>
+        <p:nvSpPr>
+          <p:cNvPr id="5" name="TextovéPole 4">
+            <a:extLst>
+              <a:ext uri="{FF2B5EF4-FFF2-40B4-BE49-F238E27FC236}">
+                <a16:creationId xmlns:a16="http://schemas.microsoft.com/office/drawing/2014/main" id="{6D29E2D1-F266-4728-B477-7A74453DBA5E}"/>
+              </a:ext>
+            </a:extLst>
+          </p:cNvPr>
+          <p:cNvSpPr txBox="1"/>
+          <p:nvPr/>
+        </p:nvSpPr>
+        <p:spPr>
+          <a:xfrm>
+            <a:off x="6766063" y="3608483"/>
+            <a:ext cx="5006837" cy="646331"/>
+          </a:xfrm>
+          <a:prstGeom prst="rect">
+            <a:avLst/>
+          </a:prstGeom>
+        </p:spPr>
+        <p:style>
+          <a:lnRef idx="2">
+            <a:schemeClr val="accent2">
+              <a:shade val="50000"/>
+            </a:schemeClr>
+          </a:lnRef>
+          <a:fillRef idx="1">
+            <a:schemeClr val="accent2"/>
+          </a:fillRef>
+          <a:effectRef idx="0">
+            <a:schemeClr val="accent2"/>
+          </a:effectRef>
+          <a:fontRef idx="minor">
+            <a:schemeClr val="lt1"/>
+          </a:fontRef>
+        </p:style>
+        <p:txBody>
+          <a:bodyPr wrap="square" rtlCol="0">
+            <a:spAutoFit/>
+          </a:bodyPr>
+          <a:lstStyle/>
+          <a:p>
+            <a:r>
+              <a:rPr lang="cs-CZ" dirty="0"/>
+              <a:t>A následně zkontrolujeme v prohlížeči, jak stránka vypadá.</a:t>
+            </a:r>
+          </a:p>
+        </p:txBody>
+      </p:sp>
+    </p:spTree>
+    <p:extLst>
+      <p:ext uri="{BB962C8B-B14F-4D97-AF65-F5344CB8AC3E}">
+        <p14:creationId xmlns:p14="http://schemas.microsoft.com/office/powerpoint/2010/main" val="762144197"/>
+      </p:ext>
+    </p:extLst>
+  </p:cSld>
+  <p:clrMapOvr>
+    <a:masterClrMapping/>
+  </p:clrMapOvr>
+</p:sld>
+</file>
+
+<file path=ppt/slides/slide26.xml><?xml version="1.0" encoding="utf-8"?>
+<p:sld xmlns:a="http://schemas.openxmlformats.org/drawingml/2006/main" xmlns:r="http://schemas.openxmlformats.org/officeDocument/2006/relationships" xmlns:p="http://schemas.openxmlformats.org/presentationml/2006/main">
+  <p:cSld>
+    <p:spTree>
+      <p:nvGrpSpPr>
+        <p:cNvPr id="1" name=""/>
+        <p:cNvGrpSpPr/>
+        <p:nvPr/>
+      </p:nvGrpSpPr>
+      <p:grpSpPr>
+        <a:xfrm>
+          <a:off x="0" y="0"/>
+          <a:ext cx="0" cy="0"/>
+          <a:chOff x="0" y="0"/>
+          <a:chExt cx="0" cy="0"/>
+        </a:xfrm>
+      </p:grpSpPr>
+      <p:sp>
+        <p:nvSpPr>
+          <p:cNvPr id="2" name="Nadpis 1">
+            <a:extLst>
+              <a:ext uri="{FF2B5EF4-FFF2-40B4-BE49-F238E27FC236}">
+                <a16:creationId xmlns:a16="http://schemas.microsoft.com/office/drawing/2014/main" id="{7EBCF6F5-8895-4CC3-9125-11AFCA69480D}"/>
+              </a:ext>
+            </a:extLst>
+          </p:cNvPr>
+          <p:cNvSpPr>
+            <a:spLocks noGrp="1"/>
+          </p:cNvSpPr>
+          <p:nvPr>
+            <p:ph type="title"/>
+          </p:nvPr>
+        </p:nvSpPr>
+        <p:spPr/>
+        <p:txBody>
+          <a:bodyPr/>
+          <a:lstStyle/>
+          <a:p>
+            <a:endParaRPr lang="en-US"/>
+          </a:p>
+        </p:txBody>
+      </p:sp>
+      <p:sp>
+        <p:nvSpPr>
+          <p:cNvPr id="3" name="Zástupný obsah 2">
+            <a:extLst>
+              <a:ext uri="{FF2B5EF4-FFF2-40B4-BE49-F238E27FC236}">
+                <a16:creationId xmlns:a16="http://schemas.microsoft.com/office/drawing/2014/main" id="{F35DB519-31CF-4BB8-9815-6941C78E1043}"/>
+              </a:ext>
+            </a:extLst>
+          </p:cNvPr>
+          <p:cNvSpPr>
+            <a:spLocks noGrp="1"/>
+          </p:cNvSpPr>
+          <p:nvPr>
+            <p:ph idx="1"/>
+          </p:nvPr>
+        </p:nvSpPr>
+        <p:spPr/>
+        <p:txBody>
+          <a:bodyPr/>
+          <a:lstStyle/>
+          <a:p>
+            <a:endParaRPr lang="en-US"/>
+          </a:p>
+        </p:txBody>
+      </p:sp>
+      <p:pic>
+        <p:nvPicPr>
+          <p:cNvPr id="4" name="Obrázek 3">
+            <a:extLst>
+              <a:ext uri="{FF2B5EF4-FFF2-40B4-BE49-F238E27FC236}">
+                <a16:creationId xmlns:a16="http://schemas.microsoft.com/office/drawing/2014/main" id="{349FF9D5-608D-4531-9750-1465BC897902}"/>
+              </a:ext>
+            </a:extLst>
+          </p:cNvPr>
+          <p:cNvPicPr>
+            <a:picLocks noChangeAspect="1"/>
+          </p:cNvPicPr>
+          <p:nvPr/>
+        </p:nvPicPr>
+        <p:blipFill>
+          <a:blip r:embed="rId2"/>
+          <a:stretch>
+            <a:fillRect/>
+          </a:stretch>
+        </p:blipFill>
+        <p:spPr>
+          <a:xfrm>
+            <a:off x="0" y="180180"/>
+            <a:ext cx="12192000" cy="6497640"/>
+          </a:xfrm>
+          <a:prstGeom prst="rect">
+            <a:avLst/>
+          </a:prstGeom>
+        </p:spPr>
+      </p:pic>
+      <p:sp>
+        <p:nvSpPr>
+          <p:cNvPr id="5" name="TextovéPole 4">
+            <a:extLst>
+              <a:ext uri="{FF2B5EF4-FFF2-40B4-BE49-F238E27FC236}">
+                <a16:creationId xmlns:a16="http://schemas.microsoft.com/office/drawing/2014/main" id="{C07B865F-9667-4FEC-8366-50B982E4BCB1}"/>
+              </a:ext>
+            </a:extLst>
+          </p:cNvPr>
+          <p:cNvSpPr txBox="1"/>
+          <p:nvPr/>
+        </p:nvSpPr>
+        <p:spPr>
+          <a:xfrm>
+            <a:off x="6766063" y="3608483"/>
+            <a:ext cx="5006837" cy="923330"/>
+          </a:xfrm>
+          <a:prstGeom prst="rect">
+            <a:avLst/>
+          </a:prstGeom>
+        </p:spPr>
+        <p:style>
+          <a:lnRef idx="2">
+            <a:schemeClr val="accent2">
+              <a:shade val="50000"/>
+            </a:schemeClr>
+          </a:lnRef>
+          <a:fillRef idx="1">
+            <a:schemeClr val="accent2"/>
+          </a:fillRef>
+          <a:effectRef idx="0">
+            <a:schemeClr val="accent2"/>
+          </a:effectRef>
+          <a:fontRef idx="minor">
+            <a:schemeClr val="lt1"/>
+          </a:fontRef>
+        </p:style>
+        <p:txBody>
+          <a:bodyPr wrap="square" rtlCol="0">
+            <a:spAutoFit/>
+          </a:bodyPr>
+          <a:lstStyle/>
+          <a:p>
+            <a:r>
+              <a:rPr lang="cs-CZ" dirty="0"/>
+              <a:t>A jdeme jo rozdělit na kousky. Vezmeme celý začátek stránky a přesuneme ho do souboru „</a:t>
+            </a:r>
+            <a:r>
+              <a:rPr lang="cs-CZ" dirty="0" err="1"/>
+              <a:t>inc</a:t>
+            </a:r>
+            <a:r>
+              <a:rPr lang="cs-CZ" dirty="0"/>
+              <a:t>/</a:t>
+            </a:r>
+            <a:r>
+              <a:rPr lang="cs-CZ" dirty="0" err="1"/>
+              <a:t>header.php</a:t>
+            </a:r>
+            <a:r>
+              <a:rPr lang="cs-CZ" dirty="0"/>
+              <a:t>“.</a:t>
+            </a:r>
+          </a:p>
+        </p:txBody>
+      </p:sp>
+    </p:spTree>
+    <p:extLst>
+      <p:ext uri="{BB962C8B-B14F-4D97-AF65-F5344CB8AC3E}">
+        <p14:creationId xmlns:p14="http://schemas.microsoft.com/office/powerpoint/2010/main" val="1905280645"/>
+      </p:ext>
+    </p:extLst>
+  </p:cSld>
+  <p:clrMapOvr>
+    <a:masterClrMapping/>
+  </p:clrMapOvr>
+</p:sld>
+</file>
+
+<file path=ppt/slides/slide27.xml><?xml version="1.0" encoding="utf-8"?>
+<p:sld xmlns:a="http://schemas.openxmlformats.org/drawingml/2006/main" xmlns:r="http://schemas.openxmlformats.org/officeDocument/2006/relationships" xmlns:p="http://schemas.openxmlformats.org/presentationml/2006/main">
+  <p:cSld>
+    <p:spTree>
+      <p:nvGrpSpPr>
+        <p:cNvPr id="1" name=""/>
+        <p:cNvGrpSpPr/>
+        <p:nvPr/>
+      </p:nvGrpSpPr>
+      <p:grpSpPr>
+        <a:xfrm>
+          <a:off x="0" y="0"/>
+          <a:ext cx="0" cy="0"/>
+          <a:chOff x="0" y="0"/>
+          <a:chExt cx="0" cy="0"/>
+        </a:xfrm>
+      </p:grpSpPr>
+      <p:sp>
+        <p:nvSpPr>
+          <p:cNvPr id="2" name="Nadpis 1">
+            <a:extLst>
+              <a:ext uri="{FF2B5EF4-FFF2-40B4-BE49-F238E27FC236}">
+                <a16:creationId xmlns:a16="http://schemas.microsoft.com/office/drawing/2014/main" id="{2FA87CC0-5AA2-4D68-9F7E-BBF2EF2BBBAD}"/>
+              </a:ext>
+            </a:extLst>
+          </p:cNvPr>
+          <p:cNvSpPr>
+            <a:spLocks noGrp="1"/>
+          </p:cNvSpPr>
+          <p:nvPr>
+            <p:ph type="title"/>
+          </p:nvPr>
+        </p:nvSpPr>
+        <p:spPr/>
+        <p:txBody>
+          <a:bodyPr/>
+          <a:lstStyle/>
+          <a:p>
+            <a:endParaRPr lang="en-US"/>
+          </a:p>
+        </p:txBody>
+      </p:sp>
+      <p:sp>
+        <p:nvSpPr>
+          <p:cNvPr id="3" name="Zástupný obsah 2">
+            <a:extLst>
+              <a:ext uri="{FF2B5EF4-FFF2-40B4-BE49-F238E27FC236}">
+                <a16:creationId xmlns:a16="http://schemas.microsoft.com/office/drawing/2014/main" id="{CBDAAEED-ACD8-4859-8516-E8FADB52639C}"/>
+              </a:ext>
+            </a:extLst>
+          </p:cNvPr>
+          <p:cNvSpPr>
+            <a:spLocks noGrp="1"/>
+          </p:cNvSpPr>
+          <p:nvPr>
+            <p:ph idx="1"/>
+          </p:nvPr>
+        </p:nvSpPr>
+        <p:spPr/>
+        <p:txBody>
+          <a:bodyPr/>
+          <a:lstStyle/>
+          <a:p>
+            <a:endParaRPr lang="en-US"/>
+          </a:p>
+        </p:txBody>
+      </p:sp>
+      <p:pic>
+        <p:nvPicPr>
+          <p:cNvPr id="4" name="Obrázek 3">
+            <a:extLst>
+              <a:ext uri="{FF2B5EF4-FFF2-40B4-BE49-F238E27FC236}">
+                <a16:creationId xmlns:a16="http://schemas.microsoft.com/office/drawing/2014/main" id="{7FF01722-3075-4E69-8BC8-9AAF106976B7}"/>
+              </a:ext>
+            </a:extLst>
+          </p:cNvPr>
+          <p:cNvPicPr>
+            <a:picLocks noChangeAspect="1"/>
+          </p:cNvPicPr>
+          <p:nvPr/>
+        </p:nvPicPr>
+        <p:blipFill>
+          <a:blip r:embed="rId2"/>
+          <a:stretch>
+            <a:fillRect/>
+          </a:stretch>
+        </p:blipFill>
+        <p:spPr>
+          <a:xfrm>
+            <a:off x="0" y="180180"/>
+            <a:ext cx="12192000" cy="6497640"/>
+          </a:xfrm>
+          <a:prstGeom prst="rect">
+            <a:avLst/>
+          </a:prstGeom>
+        </p:spPr>
+      </p:pic>
+      <p:sp>
+        <p:nvSpPr>
+          <p:cNvPr id="6" name="TextovéPole 5">
+            <a:extLst>
+              <a:ext uri="{FF2B5EF4-FFF2-40B4-BE49-F238E27FC236}">
+                <a16:creationId xmlns:a16="http://schemas.microsoft.com/office/drawing/2014/main" id="{5F3FFA54-E6FD-419C-A751-BAA9BB3F7051}"/>
+              </a:ext>
+            </a:extLst>
+          </p:cNvPr>
+          <p:cNvSpPr txBox="1"/>
+          <p:nvPr/>
+        </p:nvSpPr>
+        <p:spPr>
+          <a:xfrm>
+            <a:off x="6766063" y="3608483"/>
+            <a:ext cx="5006837" cy="646331"/>
+          </a:xfrm>
+          <a:prstGeom prst="rect">
+            <a:avLst/>
+          </a:prstGeom>
+        </p:spPr>
+        <p:style>
+          <a:lnRef idx="2">
+            <a:schemeClr val="accent2">
+              <a:shade val="50000"/>
+            </a:schemeClr>
+          </a:lnRef>
+          <a:fillRef idx="1">
+            <a:schemeClr val="accent2"/>
+          </a:fillRef>
+          <a:effectRef idx="0">
+            <a:schemeClr val="accent2"/>
+          </a:effectRef>
+          <a:fontRef idx="minor">
+            <a:schemeClr val="lt1"/>
+          </a:fontRef>
+        </p:style>
+        <p:txBody>
+          <a:bodyPr wrap="square" rtlCol="0">
+            <a:spAutoFit/>
+          </a:bodyPr>
+          <a:lstStyle/>
+          <a:p>
+            <a:r>
+              <a:rPr lang="cs-CZ" dirty="0"/>
+              <a:t>To samé pak uděláme s koncem stránky. Ten dáme do souboru „</a:t>
+            </a:r>
+            <a:r>
+              <a:rPr lang="cs-CZ" dirty="0" err="1"/>
+              <a:t>inc</a:t>
+            </a:r>
+            <a:r>
+              <a:rPr lang="cs-CZ" dirty="0"/>
+              <a:t>/</a:t>
+            </a:r>
+            <a:r>
+              <a:rPr lang="cs-CZ" dirty="0" err="1"/>
+              <a:t>footer.php</a:t>
+            </a:r>
+            <a:r>
+              <a:rPr lang="cs-CZ" dirty="0"/>
+              <a:t>“.</a:t>
+            </a:r>
+          </a:p>
+        </p:txBody>
+      </p:sp>
+    </p:spTree>
+    <p:extLst>
+      <p:ext uri="{BB962C8B-B14F-4D97-AF65-F5344CB8AC3E}">
+        <p14:creationId xmlns:p14="http://schemas.microsoft.com/office/powerpoint/2010/main" val="1562802794"/>
+      </p:ext>
+    </p:extLst>
+  </p:cSld>
+  <p:clrMapOvr>
+    <a:masterClrMapping/>
+  </p:clrMapOvr>
+</p:sld>
+</file>
+
+<file path=ppt/slides/slide28.xml><?xml version="1.0" encoding="utf-8"?>
+<p:sld xmlns:a="http://schemas.openxmlformats.org/drawingml/2006/main" xmlns:r="http://schemas.openxmlformats.org/officeDocument/2006/relationships" xmlns:p="http://schemas.openxmlformats.org/presentationml/2006/main">
+  <p:cSld>
+    <p:spTree>
+      <p:nvGrpSpPr>
+        <p:cNvPr id="1" name=""/>
+        <p:cNvGrpSpPr/>
+        <p:nvPr/>
+      </p:nvGrpSpPr>
+      <p:grpSpPr>
+        <a:xfrm>
+          <a:off x="0" y="0"/>
+          <a:ext cx="0" cy="0"/>
+          <a:chOff x="0" y="0"/>
+          <a:chExt cx="0" cy="0"/>
+        </a:xfrm>
+      </p:grpSpPr>
+      <p:sp>
+        <p:nvSpPr>
+          <p:cNvPr id="2" name="Nadpis 1">
+            <a:extLst>
+              <a:ext uri="{FF2B5EF4-FFF2-40B4-BE49-F238E27FC236}">
+                <a16:creationId xmlns:a16="http://schemas.microsoft.com/office/drawing/2014/main" id="{ABB6E22E-338F-4E14-8054-911A46EA19BF}"/>
+              </a:ext>
+            </a:extLst>
+          </p:cNvPr>
+          <p:cNvSpPr>
+            <a:spLocks noGrp="1"/>
+          </p:cNvSpPr>
+          <p:nvPr>
+            <p:ph type="title"/>
+          </p:nvPr>
+        </p:nvSpPr>
+        <p:spPr/>
+        <p:txBody>
+          <a:bodyPr/>
+          <a:lstStyle/>
+          <a:p>
+            <a:endParaRPr lang="en-US"/>
+          </a:p>
+        </p:txBody>
+      </p:sp>
+      <p:sp>
+        <p:nvSpPr>
+          <p:cNvPr id="3" name="Zástupný obsah 2">
+            <a:extLst>
+              <a:ext uri="{FF2B5EF4-FFF2-40B4-BE49-F238E27FC236}">
+                <a16:creationId xmlns:a16="http://schemas.microsoft.com/office/drawing/2014/main" id="{F8BFF004-B499-4F76-95B7-ACEFA96B09F4}"/>
+              </a:ext>
+            </a:extLst>
+          </p:cNvPr>
+          <p:cNvSpPr>
+            <a:spLocks noGrp="1"/>
+          </p:cNvSpPr>
+          <p:nvPr>
+            <p:ph idx="1"/>
+          </p:nvPr>
+        </p:nvSpPr>
+        <p:spPr/>
+        <p:txBody>
+          <a:bodyPr/>
+          <a:lstStyle/>
+          <a:p>
+            <a:endParaRPr lang="en-US"/>
+          </a:p>
+        </p:txBody>
+      </p:sp>
+      <p:pic>
+        <p:nvPicPr>
+          <p:cNvPr id="4" name="Obrázek 3">
+            <a:extLst>
+              <a:ext uri="{FF2B5EF4-FFF2-40B4-BE49-F238E27FC236}">
+                <a16:creationId xmlns:a16="http://schemas.microsoft.com/office/drawing/2014/main" id="{54ED4DA2-CB6D-4F45-A13C-F31C1EE4C24E}"/>
+              </a:ext>
+            </a:extLst>
+          </p:cNvPr>
+          <p:cNvPicPr>
+            <a:picLocks noChangeAspect="1"/>
+          </p:cNvPicPr>
+          <p:nvPr/>
+        </p:nvPicPr>
+        <p:blipFill>
+          <a:blip r:embed="rId2"/>
+          <a:stretch>
+            <a:fillRect/>
+          </a:stretch>
+        </p:blipFill>
+        <p:spPr>
+          <a:xfrm>
+            <a:off x="0" y="180180"/>
+            <a:ext cx="12192000" cy="6497640"/>
+          </a:xfrm>
+          <a:prstGeom prst="rect">
+            <a:avLst/>
+          </a:prstGeom>
+        </p:spPr>
+      </p:pic>
+      <p:sp>
+        <p:nvSpPr>
+          <p:cNvPr id="5" name="TextovéPole 4">
+            <a:extLst>
+              <a:ext uri="{FF2B5EF4-FFF2-40B4-BE49-F238E27FC236}">
+                <a16:creationId xmlns:a16="http://schemas.microsoft.com/office/drawing/2014/main" id="{918F6FED-4856-4AAB-A3F4-6CE0C2A984CD}"/>
+              </a:ext>
+            </a:extLst>
+          </p:cNvPr>
+          <p:cNvSpPr txBox="1"/>
+          <p:nvPr/>
+        </p:nvSpPr>
+        <p:spPr>
+          <a:xfrm>
+            <a:off x="6766063" y="3608483"/>
+            <a:ext cx="5006837" cy="2308324"/>
+          </a:xfrm>
+          <a:prstGeom prst="rect">
+            <a:avLst/>
+          </a:prstGeom>
+        </p:spPr>
+        <p:style>
+          <a:lnRef idx="2">
+            <a:schemeClr val="accent2">
+              <a:shade val="50000"/>
+            </a:schemeClr>
+          </a:lnRef>
+          <a:fillRef idx="1">
+            <a:schemeClr val="accent2"/>
+          </a:fillRef>
+          <a:effectRef idx="0">
+            <a:schemeClr val="accent2"/>
+          </a:effectRef>
+          <a:fontRef idx="minor">
+            <a:schemeClr val="lt1"/>
+          </a:fontRef>
+        </p:style>
+        <p:txBody>
+          <a:bodyPr wrap="square" rtlCol="0">
+            <a:spAutoFit/>
+          </a:bodyPr>
+          <a:lstStyle/>
+          <a:p>
+            <a:r>
+              <a:rPr lang="en-US" dirty="0" err="1"/>
+              <a:t>Vr</a:t>
+            </a:r>
+            <a:r>
+              <a:rPr lang="cs-CZ" dirty="0" err="1"/>
+              <a:t>átíme</a:t>
+            </a:r>
+            <a:r>
+              <a:rPr lang="cs-CZ" dirty="0"/>
+              <a:t> se do souboru s hlavičkou stránek a doplníme do ní </a:t>
+            </a:r>
+            <a:r>
+              <a:rPr lang="cs-CZ" dirty="0" err="1"/>
+              <a:t>title</a:t>
+            </a:r>
+            <a:r>
+              <a:rPr lang="cs-CZ" dirty="0"/>
+              <a:t>.</a:t>
+            </a:r>
+          </a:p>
+          <a:p>
+            <a:endParaRPr lang="cs-CZ" dirty="0"/>
+          </a:p>
+          <a:p>
+            <a:r>
+              <a:rPr lang="cs-CZ" dirty="0" err="1"/>
+              <a:t>Title</a:t>
+            </a:r>
+            <a:r>
+              <a:rPr lang="cs-CZ" dirty="0"/>
+              <a:t> by měl obsahovat nejen název celé aplikace, ale také název dané stránky. K tomu si připravíme výpis proměnné „</a:t>
+            </a:r>
+            <a:r>
+              <a:rPr lang="en-US" dirty="0"/>
+              <a:t>$</a:t>
+            </a:r>
+            <a:r>
+              <a:rPr lang="en-US" dirty="0" err="1"/>
+              <a:t>pageTitle</a:t>
+            </a:r>
+            <a:r>
+              <a:rPr lang="cs-CZ" dirty="0"/>
+              <a:t>“</a:t>
+            </a:r>
+            <a:r>
+              <a:rPr lang="en-US" dirty="0"/>
+              <a:t>.</a:t>
+            </a:r>
+            <a:endParaRPr lang="cs-CZ" dirty="0"/>
+          </a:p>
+          <a:p>
+            <a:r>
+              <a:rPr lang="cs-CZ" dirty="0"/>
+              <a:t>Když budeme hlavičku </a:t>
+            </a:r>
+            <a:r>
+              <a:rPr lang="cs-CZ" dirty="0" err="1"/>
+              <a:t>includovat</a:t>
+            </a:r>
+            <a:r>
+              <a:rPr lang="cs-CZ" dirty="0"/>
+              <a:t> do jednotlivých stránek, tak pomocí této proměnné upravíme </a:t>
+            </a:r>
+            <a:r>
+              <a:rPr lang="cs-CZ" dirty="0" err="1"/>
+              <a:t>title</a:t>
+            </a:r>
+            <a:r>
+              <a:rPr lang="cs-CZ" dirty="0"/>
+              <a:t>.</a:t>
+            </a:r>
+          </a:p>
+        </p:txBody>
+      </p:sp>
+    </p:spTree>
+    <p:extLst>
+      <p:ext uri="{BB962C8B-B14F-4D97-AF65-F5344CB8AC3E}">
+        <p14:creationId xmlns:p14="http://schemas.microsoft.com/office/powerpoint/2010/main" val="19066128"/>
+      </p:ext>
+    </p:extLst>
+  </p:cSld>
+  <p:clrMapOvr>
+    <a:masterClrMapping/>
+  </p:clrMapOvr>
+</p:sld>
+</file>
+
+<file path=ppt/slides/slide29.xml><?xml version="1.0" encoding="utf-8"?>
+<p:sld xmlns:a="http://schemas.openxmlformats.org/drawingml/2006/main" xmlns:r="http://schemas.openxmlformats.org/officeDocument/2006/relationships" xmlns:p="http://schemas.openxmlformats.org/presentationml/2006/main">
+  <p:cSld>
+    <p:spTree>
+      <p:nvGrpSpPr>
+        <p:cNvPr id="1" name=""/>
+        <p:cNvGrpSpPr/>
+        <p:nvPr/>
+      </p:nvGrpSpPr>
+      <p:grpSpPr>
+        <a:xfrm>
+          <a:off x="0" y="0"/>
+          <a:ext cx="0" cy="0"/>
+          <a:chOff x="0" y="0"/>
+          <a:chExt cx="0" cy="0"/>
+        </a:xfrm>
+      </p:grpSpPr>
+      <p:sp>
+        <p:nvSpPr>
+          <p:cNvPr id="2" name="Nadpis 1">
+            <a:extLst>
+              <a:ext uri="{FF2B5EF4-FFF2-40B4-BE49-F238E27FC236}">
+                <a16:creationId xmlns:a16="http://schemas.microsoft.com/office/drawing/2014/main" id="{FF1E6660-9FF4-4618-ACC9-2B6A8D0272E4}"/>
+              </a:ext>
+            </a:extLst>
+          </p:cNvPr>
+          <p:cNvSpPr>
+            <a:spLocks noGrp="1"/>
+          </p:cNvSpPr>
+          <p:nvPr>
+            <p:ph type="title"/>
+          </p:nvPr>
+        </p:nvSpPr>
+        <p:spPr/>
+        <p:txBody>
+          <a:bodyPr/>
+          <a:lstStyle/>
+          <a:p>
+            <a:endParaRPr lang="en-US"/>
+          </a:p>
+        </p:txBody>
+      </p:sp>
+      <p:sp>
+        <p:nvSpPr>
+          <p:cNvPr id="3" name="Zástupný obsah 2">
+            <a:extLst>
+              <a:ext uri="{FF2B5EF4-FFF2-40B4-BE49-F238E27FC236}">
+                <a16:creationId xmlns:a16="http://schemas.microsoft.com/office/drawing/2014/main" id="{3E823DE9-C0D9-43D6-8B3F-4FB926EF7504}"/>
+              </a:ext>
+            </a:extLst>
+          </p:cNvPr>
+          <p:cNvSpPr>
+            <a:spLocks noGrp="1"/>
+          </p:cNvSpPr>
+          <p:nvPr>
+            <p:ph idx="1"/>
+          </p:nvPr>
+        </p:nvSpPr>
+        <p:spPr/>
+        <p:txBody>
+          <a:bodyPr/>
+          <a:lstStyle/>
+          <a:p>
+            <a:endParaRPr lang="en-US"/>
+          </a:p>
+        </p:txBody>
+      </p:sp>
+      <p:pic>
+        <p:nvPicPr>
+          <p:cNvPr id="4" name="Obrázek 3">
+            <a:extLst>
+              <a:ext uri="{FF2B5EF4-FFF2-40B4-BE49-F238E27FC236}">
+                <a16:creationId xmlns:a16="http://schemas.microsoft.com/office/drawing/2014/main" id="{3EDC1D92-9093-409A-AF01-5A770825E5DD}"/>
+              </a:ext>
+            </a:extLst>
+          </p:cNvPr>
+          <p:cNvPicPr>
+            <a:picLocks noChangeAspect="1"/>
+          </p:cNvPicPr>
+          <p:nvPr/>
+        </p:nvPicPr>
+        <p:blipFill>
+          <a:blip r:embed="rId2"/>
+          <a:stretch>
+            <a:fillRect/>
+          </a:stretch>
+        </p:blipFill>
+        <p:spPr>
+          <a:xfrm>
+            <a:off x="0" y="180180"/>
+            <a:ext cx="12192000" cy="6497640"/>
+          </a:xfrm>
+          <a:prstGeom prst="rect">
+            <a:avLst/>
+          </a:prstGeom>
+        </p:spPr>
+      </p:pic>
+      <p:sp>
+        <p:nvSpPr>
+          <p:cNvPr id="5" name="TextovéPole 4">
+            <a:extLst>
+              <a:ext uri="{FF2B5EF4-FFF2-40B4-BE49-F238E27FC236}">
+                <a16:creationId xmlns:a16="http://schemas.microsoft.com/office/drawing/2014/main" id="{99450A36-6F3D-4586-B6B4-843D8B8D9D41}"/>
+              </a:ext>
+            </a:extLst>
+          </p:cNvPr>
+          <p:cNvSpPr txBox="1"/>
+          <p:nvPr/>
+        </p:nvSpPr>
+        <p:spPr>
+          <a:xfrm>
+            <a:off x="6766063" y="3608483"/>
+            <a:ext cx="5006837" cy="923330"/>
+          </a:xfrm>
+          <a:prstGeom prst="rect">
+            <a:avLst/>
+          </a:prstGeom>
+        </p:spPr>
+        <p:style>
+          <a:lnRef idx="2">
+            <a:schemeClr val="accent2">
+              <a:shade val="50000"/>
+            </a:schemeClr>
+          </a:lnRef>
+          <a:fillRef idx="1">
+            <a:schemeClr val="accent2"/>
+          </a:fillRef>
+          <a:effectRef idx="0">
+            <a:schemeClr val="accent2"/>
+          </a:effectRef>
+          <a:fontRef idx="minor">
+            <a:schemeClr val="lt1"/>
+          </a:fontRef>
+        </p:style>
+        <p:txBody>
+          <a:bodyPr wrap="square" rtlCol="0">
+            <a:spAutoFit/>
+          </a:bodyPr>
+          <a:lstStyle/>
+          <a:p>
+            <a:r>
+              <a:rPr lang="cs-CZ" dirty="0"/>
+              <a:t>Přepneme se do souboru </a:t>
+            </a:r>
+            <a:r>
+              <a:rPr lang="cs-CZ" dirty="0" err="1"/>
+              <a:t>index.php</a:t>
+            </a:r>
+            <a:r>
+              <a:rPr lang="cs-CZ" dirty="0"/>
+              <a:t>, odstraníme zbylý řádek textu a uděláme z něj prázdný PHP soubor.</a:t>
+            </a:r>
+          </a:p>
+        </p:txBody>
+      </p:sp>
+    </p:spTree>
+    <p:extLst>
+      <p:ext uri="{BB962C8B-B14F-4D97-AF65-F5344CB8AC3E}">
+        <p14:creationId xmlns:p14="http://schemas.microsoft.com/office/powerpoint/2010/main" val="3450583557"/>
+      </p:ext>
+    </p:extLst>
+  </p:cSld>
+  <p:clrMapOvr>
+    <a:masterClrMapping/>
+  </p:clrMapOvr>
+</p:sld>
+</file>
+
 <file path=ppt/slides/slide3.xml><?xml version="1.0" encoding="utf-8"?>
 <p:sld xmlns:a="http://schemas.openxmlformats.org/drawingml/2006/main" xmlns:r="http://schemas.openxmlformats.org/officeDocument/2006/relationships" xmlns:p="http://schemas.openxmlformats.org/presentationml/2006/main">
   <p:cSld>
@@ -5784,6 +7253,1696 @@
     <p:extLst>
       <p:ext uri="{BB962C8B-B14F-4D97-AF65-F5344CB8AC3E}">
         <p14:creationId xmlns:p14="http://schemas.microsoft.com/office/powerpoint/2010/main" val="3439495336"/>
+      </p:ext>
+    </p:extLst>
+  </p:cSld>
+  <p:clrMapOvr>
+    <a:masterClrMapping/>
+  </p:clrMapOvr>
+</p:sld>
+</file>
+
+<file path=ppt/slides/slide30.xml><?xml version="1.0" encoding="utf-8"?>
+<p:sld xmlns:a="http://schemas.openxmlformats.org/drawingml/2006/main" xmlns:r="http://schemas.openxmlformats.org/officeDocument/2006/relationships" xmlns:p="http://schemas.openxmlformats.org/presentationml/2006/main">
+  <p:cSld>
+    <p:spTree>
+      <p:nvGrpSpPr>
+        <p:cNvPr id="1" name=""/>
+        <p:cNvGrpSpPr/>
+        <p:nvPr/>
+      </p:nvGrpSpPr>
+      <p:grpSpPr>
+        <a:xfrm>
+          <a:off x="0" y="0"/>
+          <a:ext cx="0" cy="0"/>
+          <a:chOff x="0" y="0"/>
+          <a:chExt cx="0" cy="0"/>
+        </a:xfrm>
+      </p:grpSpPr>
+      <p:sp>
+        <p:nvSpPr>
+          <p:cNvPr id="2" name="Nadpis 1">
+            <a:extLst>
+              <a:ext uri="{FF2B5EF4-FFF2-40B4-BE49-F238E27FC236}">
+                <a16:creationId xmlns:a16="http://schemas.microsoft.com/office/drawing/2014/main" id="{56C96ED8-7386-4443-9D0A-A047F1CE50BC}"/>
+              </a:ext>
+            </a:extLst>
+          </p:cNvPr>
+          <p:cNvSpPr>
+            <a:spLocks noGrp="1"/>
+          </p:cNvSpPr>
+          <p:nvPr>
+            <p:ph type="title"/>
+          </p:nvPr>
+        </p:nvSpPr>
+        <p:spPr/>
+        <p:txBody>
+          <a:bodyPr/>
+          <a:lstStyle/>
+          <a:p>
+            <a:endParaRPr lang="en-US"/>
+          </a:p>
+        </p:txBody>
+      </p:sp>
+      <p:sp>
+        <p:nvSpPr>
+          <p:cNvPr id="3" name="Zástupný obsah 2">
+            <a:extLst>
+              <a:ext uri="{FF2B5EF4-FFF2-40B4-BE49-F238E27FC236}">
+                <a16:creationId xmlns:a16="http://schemas.microsoft.com/office/drawing/2014/main" id="{9CEBF13A-51FC-4202-9A66-DDDAF12D44F7}"/>
+              </a:ext>
+            </a:extLst>
+          </p:cNvPr>
+          <p:cNvSpPr>
+            <a:spLocks noGrp="1"/>
+          </p:cNvSpPr>
+          <p:nvPr>
+            <p:ph idx="1"/>
+          </p:nvPr>
+        </p:nvSpPr>
+        <p:spPr/>
+        <p:txBody>
+          <a:bodyPr/>
+          <a:lstStyle/>
+          <a:p>
+            <a:endParaRPr lang="en-US"/>
+          </a:p>
+        </p:txBody>
+      </p:sp>
+      <p:pic>
+        <p:nvPicPr>
+          <p:cNvPr id="6" name="Obrázek 5">
+            <a:extLst>
+              <a:ext uri="{FF2B5EF4-FFF2-40B4-BE49-F238E27FC236}">
+                <a16:creationId xmlns:a16="http://schemas.microsoft.com/office/drawing/2014/main" id="{B8EACCF1-FD9E-46FB-A313-FF5EB9CC3276}"/>
+              </a:ext>
+            </a:extLst>
+          </p:cNvPr>
+          <p:cNvPicPr>
+            <a:picLocks noChangeAspect="1"/>
+          </p:cNvPicPr>
+          <p:nvPr/>
+        </p:nvPicPr>
+        <p:blipFill>
+          <a:blip r:embed="rId2"/>
+          <a:stretch>
+            <a:fillRect/>
+          </a:stretch>
+        </p:blipFill>
+        <p:spPr>
+          <a:xfrm>
+            <a:off x="0" y="180180"/>
+            <a:ext cx="12192000" cy="6497640"/>
+          </a:xfrm>
+          <a:prstGeom prst="rect">
+            <a:avLst/>
+          </a:prstGeom>
+        </p:spPr>
+      </p:pic>
+      <p:sp>
+        <p:nvSpPr>
+          <p:cNvPr id="7" name="TextovéPole 6">
+            <a:extLst>
+              <a:ext uri="{FF2B5EF4-FFF2-40B4-BE49-F238E27FC236}">
+                <a16:creationId xmlns:a16="http://schemas.microsoft.com/office/drawing/2014/main" id="{8FBC4685-0D67-4DB6-9AE5-D49F6F982B06}"/>
+              </a:ext>
+            </a:extLst>
+          </p:cNvPr>
+          <p:cNvSpPr txBox="1"/>
+          <p:nvPr/>
+        </p:nvSpPr>
+        <p:spPr>
+          <a:xfrm>
+            <a:off x="6766063" y="3608483"/>
+            <a:ext cx="5006837" cy="646331"/>
+          </a:xfrm>
+          <a:prstGeom prst="rect">
+            <a:avLst/>
+          </a:prstGeom>
+        </p:spPr>
+        <p:style>
+          <a:lnRef idx="2">
+            <a:schemeClr val="accent2">
+              <a:shade val="50000"/>
+            </a:schemeClr>
+          </a:lnRef>
+          <a:fillRef idx="1">
+            <a:schemeClr val="accent2"/>
+          </a:fillRef>
+          <a:effectRef idx="0">
+            <a:schemeClr val="accent2"/>
+          </a:effectRef>
+          <a:fontRef idx="minor">
+            <a:schemeClr val="lt1"/>
+          </a:fontRef>
+        </p:style>
+        <p:txBody>
+          <a:bodyPr wrap="square" rtlCol="0">
+            <a:spAutoFit/>
+          </a:bodyPr>
+          <a:lstStyle/>
+          <a:p>
+            <a:r>
+              <a:rPr lang="cs-CZ" dirty="0"/>
+              <a:t>Následně zde načteme připojení k databázi, hlavičku a patičku.</a:t>
+            </a:r>
+          </a:p>
+        </p:txBody>
+      </p:sp>
+    </p:spTree>
+    <p:extLst>
+      <p:ext uri="{BB962C8B-B14F-4D97-AF65-F5344CB8AC3E}">
+        <p14:creationId xmlns:p14="http://schemas.microsoft.com/office/powerpoint/2010/main" val="956145587"/>
+      </p:ext>
+    </p:extLst>
+  </p:cSld>
+  <p:clrMapOvr>
+    <a:masterClrMapping/>
+  </p:clrMapOvr>
+</p:sld>
+</file>
+
+<file path=ppt/slides/slide31.xml><?xml version="1.0" encoding="utf-8"?>
+<p:sld xmlns:a="http://schemas.openxmlformats.org/drawingml/2006/main" xmlns:r="http://schemas.openxmlformats.org/officeDocument/2006/relationships" xmlns:p="http://schemas.openxmlformats.org/presentationml/2006/main">
+  <p:cSld>
+    <p:spTree>
+      <p:nvGrpSpPr>
+        <p:cNvPr id="1" name=""/>
+        <p:cNvGrpSpPr/>
+        <p:nvPr/>
+      </p:nvGrpSpPr>
+      <p:grpSpPr>
+        <a:xfrm>
+          <a:off x="0" y="0"/>
+          <a:ext cx="0" cy="0"/>
+          <a:chOff x="0" y="0"/>
+          <a:chExt cx="0" cy="0"/>
+        </a:xfrm>
+      </p:grpSpPr>
+      <p:sp>
+        <p:nvSpPr>
+          <p:cNvPr id="2" name="Nadpis 1">
+            <a:extLst>
+              <a:ext uri="{FF2B5EF4-FFF2-40B4-BE49-F238E27FC236}">
+                <a16:creationId xmlns:a16="http://schemas.microsoft.com/office/drawing/2014/main" id="{E967A85A-8B0E-4465-823B-5360017B8DD6}"/>
+              </a:ext>
+            </a:extLst>
+          </p:cNvPr>
+          <p:cNvSpPr>
+            <a:spLocks noGrp="1"/>
+          </p:cNvSpPr>
+          <p:nvPr>
+            <p:ph type="title"/>
+          </p:nvPr>
+        </p:nvSpPr>
+        <p:spPr/>
+        <p:txBody>
+          <a:bodyPr/>
+          <a:lstStyle/>
+          <a:p>
+            <a:endParaRPr lang="en-US"/>
+          </a:p>
+        </p:txBody>
+      </p:sp>
+      <p:sp>
+        <p:nvSpPr>
+          <p:cNvPr id="3" name="Zástupný obsah 2">
+            <a:extLst>
+              <a:ext uri="{FF2B5EF4-FFF2-40B4-BE49-F238E27FC236}">
+                <a16:creationId xmlns:a16="http://schemas.microsoft.com/office/drawing/2014/main" id="{2AAA00D6-7880-44C6-83F2-D93B55291E7B}"/>
+              </a:ext>
+            </a:extLst>
+          </p:cNvPr>
+          <p:cNvSpPr>
+            <a:spLocks noGrp="1"/>
+          </p:cNvSpPr>
+          <p:nvPr>
+            <p:ph idx="1"/>
+          </p:nvPr>
+        </p:nvSpPr>
+        <p:spPr/>
+        <p:txBody>
+          <a:bodyPr/>
+          <a:lstStyle/>
+          <a:p>
+            <a:endParaRPr lang="en-US"/>
+          </a:p>
+        </p:txBody>
+      </p:sp>
+      <p:pic>
+        <p:nvPicPr>
+          <p:cNvPr id="4" name="Obrázek 3">
+            <a:extLst>
+              <a:ext uri="{FF2B5EF4-FFF2-40B4-BE49-F238E27FC236}">
+                <a16:creationId xmlns:a16="http://schemas.microsoft.com/office/drawing/2014/main" id="{5B32895B-535C-4C11-A042-F6A570A26C6D}"/>
+              </a:ext>
+            </a:extLst>
+          </p:cNvPr>
+          <p:cNvPicPr>
+            <a:picLocks noChangeAspect="1"/>
+          </p:cNvPicPr>
+          <p:nvPr/>
+        </p:nvPicPr>
+        <p:blipFill>
+          <a:blip r:embed="rId2"/>
+          <a:stretch>
+            <a:fillRect/>
+          </a:stretch>
+        </p:blipFill>
+        <p:spPr>
+          <a:xfrm>
+            <a:off x="0" y="180180"/>
+            <a:ext cx="12192000" cy="6497640"/>
+          </a:xfrm>
+          <a:prstGeom prst="rect">
+            <a:avLst/>
+          </a:prstGeom>
+        </p:spPr>
+      </p:pic>
+      <p:sp>
+        <p:nvSpPr>
+          <p:cNvPr id="5" name="TextovéPole 4">
+            <a:extLst>
+              <a:ext uri="{FF2B5EF4-FFF2-40B4-BE49-F238E27FC236}">
+                <a16:creationId xmlns:a16="http://schemas.microsoft.com/office/drawing/2014/main" id="{BB25BE1E-5865-4F50-92C5-34DF583C76DB}"/>
+              </a:ext>
+            </a:extLst>
+          </p:cNvPr>
+          <p:cNvSpPr txBox="1"/>
+          <p:nvPr/>
+        </p:nvSpPr>
+        <p:spPr>
+          <a:xfrm>
+            <a:off x="6766063" y="3608483"/>
+            <a:ext cx="5006837" cy="1200329"/>
+          </a:xfrm>
+          <a:prstGeom prst="rect">
+            <a:avLst/>
+          </a:prstGeom>
+        </p:spPr>
+        <p:style>
+          <a:lnRef idx="2">
+            <a:schemeClr val="accent2">
+              <a:shade val="50000"/>
+            </a:schemeClr>
+          </a:lnRef>
+          <a:fillRef idx="1">
+            <a:schemeClr val="accent2"/>
+          </a:fillRef>
+          <a:effectRef idx="0">
+            <a:schemeClr val="accent2"/>
+          </a:effectRef>
+          <a:fontRef idx="minor">
+            <a:schemeClr val="lt1"/>
+          </a:fontRef>
+        </p:style>
+        <p:txBody>
+          <a:bodyPr wrap="square" rtlCol="0">
+            <a:spAutoFit/>
+          </a:bodyPr>
+          <a:lstStyle/>
+          <a:p>
+            <a:r>
+              <a:rPr lang="cs-CZ" dirty="0"/>
+              <a:t>Pokud jsme nastavili správné údaje pro připojení k databázi, tak při zobrazení přes server vidíme prázdnou stránku jen s naší hlavičkou a patičkou.</a:t>
+            </a:r>
+          </a:p>
+          <a:p>
+            <a:r>
+              <a:rPr lang="cs-CZ" dirty="0"/>
+              <a:t>(Neměla by zde být žádná chyba.)</a:t>
+            </a:r>
+          </a:p>
+        </p:txBody>
+      </p:sp>
+    </p:spTree>
+    <p:extLst>
+      <p:ext uri="{BB962C8B-B14F-4D97-AF65-F5344CB8AC3E}">
+        <p14:creationId xmlns:p14="http://schemas.microsoft.com/office/powerpoint/2010/main" val="1020223520"/>
+      </p:ext>
+    </p:extLst>
+  </p:cSld>
+  <p:clrMapOvr>
+    <a:masterClrMapping/>
+  </p:clrMapOvr>
+</p:sld>
+</file>
+
+<file path=ppt/slides/slide32.xml><?xml version="1.0" encoding="utf-8"?>
+<p:sld xmlns:a="http://schemas.openxmlformats.org/drawingml/2006/main" xmlns:r="http://schemas.openxmlformats.org/officeDocument/2006/relationships" xmlns:p="http://schemas.openxmlformats.org/presentationml/2006/main">
+  <p:cSld>
+    <p:spTree>
+      <p:nvGrpSpPr>
+        <p:cNvPr id="1" name=""/>
+        <p:cNvGrpSpPr/>
+        <p:nvPr/>
+      </p:nvGrpSpPr>
+      <p:grpSpPr>
+        <a:xfrm>
+          <a:off x="0" y="0"/>
+          <a:ext cx="0" cy="0"/>
+          <a:chOff x="0" y="0"/>
+          <a:chExt cx="0" cy="0"/>
+        </a:xfrm>
+      </p:grpSpPr>
+      <p:sp>
+        <p:nvSpPr>
+          <p:cNvPr id="2" name="Nadpis 1">
+            <a:extLst>
+              <a:ext uri="{FF2B5EF4-FFF2-40B4-BE49-F238E27FC236}">
+                <a16:creationId xmlns:a16="http://schemas.microsoft.com/office/drawing/2014/main" id="{E85FCA4A-D184-4F2D-A34A-4EF7070E314B}"/>
+              </a:ext>
+            </a:extLst>
+          </p:cNvPr>
+          <p:cNvSpPr>
+            <a:spLocks noGrp="1"/>
+          </p:cNvSpPr>
+          <p:nvPr>
+            <p:ph type="title"/>
+          </p:nvPr>
+        </p:nvSpPr>
+        <p:spPr/>
+        <p:txBody>
+          <a:bodyPr/>
+          <a:lstStyle/>
+          <a:p>
+            <a:endParaRPr lang="en-US" dirty="0"/>
+          </a:p>
+        </p:txBody>
+      </p:sp>
+      <p:sp>
+        <p:nvSpPr>
+          <p:cNvPr id="3" name="Zástupný obsah 2">
+            <a:extLst>
+              <a:ext uri="{FF2B5EF4-FFF2-40B4-BE49-F238E27FC236}">
+                <a16:creationId xmlns:a16="http://schemas.microsoft.com/office/drawing/2014/main" id="{A265473E-D209-4B5B-BD9F-4EB530588D70}"/>
+              </a:ext>
+            </a:extLst>
+          </p:cNvPr>
+          <p:cNvSpPr>
+            <a:spLocks noGrp="1"/>
+          </p:cNvSpPr>
+          <p:nvPr>
+            <p:ph idx="1"/>
+          </p:nvPr>
+        </p:nvSpPr>
+        <p:spPr/>
+        <p:txBody>
+          <a:bodyPr/>
+          <a:lstStyle/>
+          <a:p>
+            <a:pPr marL="0" indent="0">
+              <a:buNone/>
+            </a:pPr>
+            <a:r>
+              <a:rPr lang="cs-CZ" dirty="0"/>
+              <a:t>V rámci tvorby aplikace začneme výpisem příspěvků z databáze.</a:t>
+            </a:r>
+            <a:endParaRPr lang="en-US" dirty="0"/>
+          </a:p>
+        </p:txBody>
+      </p:sp>
+    </p:spTree>
+    <p:extLst>
+      <p:ext uri="{BB962C8B-B14F-4D97-AF65-F5344CB8AC3E}">
+        <p14:creationId xmlns:p14="http://schemas.microsoft.com/office/powerpoint/2010/main" val="2917830871"/>
+      </p:ext>
+    </p:extLst>
+  </p:cSld>
+  <p:clrMapOvr>
+    <a:masterClrMapping/>
+  </p:clrMapOvr>
+</p:sld>
+</file>
+
+<file path=ppt/slides/slide33.xml><?xml version="1.0" encoding="utf-8"?>
+<p:sld xmlns:a="http://schemas.openxmlformats.org/drawingml/2006/main" xmlns:r="http://schemas.openxmlformats.org/officeDocument/2006/relationships" xmlns:p="http://schemas.openxmlformats.org/presentationml/2006/main">
+  <p:cSld>
+    <p:spTree>
+      <p:nvGrpSpPr>
+        <p:cNvPr id="1" name=""/>
+        <p:cNvGrpSpPr/>
+        <p:nvPr/>
+      </p:nvGrpSpPr>
+      <p:grpSpPr>
+        <a:xfrm>
+          <a:off x="0" y="0"/>
+          <a:ext cx="0" cy="0"/>
+          <a:chOff x="0" y="0"/>
+          <a:chExt cx="0" cy="0"/>
+        </a:xfrm>
+      </p:grpSpPr>
+      <p:sp>
+        <p:nvSpPr>
+          <p:cNvPr id="2" name="Nadpis 1">
+            <a:extLst>
+              <a:ext uri="{FF2B5EF4-FFF2-40B4-BE49-F238E27FC236}">
+                <a16:creationId xmlns:a16="http://schemas.microsoft.com/office/drawing/2014/main" id="{AF259A1B-DD48-4F34-85B6-2A8C1D29AE4A}"/>
+              </a:ext>
+            </a:extLst>
+          </p:cNvPr>
+          <p:cNvSpPr>
+            <a:spLocks noGrp="1"/>
+          </p:cNvSpPr>
+          <p:nvPr>
+            <p:ph type="title"/>
+          </p:nvPr>
+        </p:nvSpPr>
+        <p:spPr/>
+        <p:txBody>
+          <a:bodyPr/>
+          <a:lstStyle/>
+          <a:p>
+            <a:endParaRPr lang="en-US"/>
+          </a:p>
+        </p:txBody>
+      </p:sp>
+      <p:sp>
+        <p:nvSpPr>
+          <p:cNvPr id="3" name="Zástupný obsah 2">
+            <a:extLst>
+              <a:ext uri="{FF2B5EF4-FFF2-40B4-BE49-F238E27FC236}">
+                <a16:creationId xmlns:a16="http://schemas.microsoft.com/office/drawing/2014/main" id="{4C5DDCC0-DEC1-4D2F-94C0-AF9243CC7EAC}"/>
+              </a:ext>
+            </a:extLst>
+          </p:cNvPr>
+          <p:cNvSpPr>
+            <a:spLocks noGrp="1"/>
+          </p:cNvSpPr>
+          <p:nvPr>
+            <p:ph idx="1"/>
+          </p:nvPr>
+        </p:nvSpPr>
+        <p:spPr/>
+        <p:txBody>
+          <a:bodyPr/>
+          <a:lstStyle/>
+          <a:p>
+            <a:endParaRPr lang="en-US"/>
+          </a:p>
+        </p:txBody>
+      </p:sp>
+      <p:pic>
+        <p:nvPicPr>
+          <p:cNvPr id="4" name="Obrázek 3">
+            <a:extLst>
+              <a:ext uri="{FF2B5EF4-FFF2-40B4-BE49-F238E27FC236}">
+                <a16:creationId xmlns:a16="http://schemas.microsoft.com/office/drawing/2014/main" id="{67D96DAA-6C3A-45F5-ADFA-A24E01A8B33D}"/>
+              </a:ext>
+            </a:extLst>
+          </p:cNvPr>
+          <p:cNvPicPr>
+            <a:picLocks noChangeAspect="1"/>
+          </p:cNvPicPr>
+          <p:nvPr/>
+        </p:nvPicPr>
+        <p:blipFill>
+          <a:blip r:embed="rId2"/>
+          <a:stretch>
+            <a:fillRect/>
+          </a:stretch>
+        </p:blipFill>
+        <p:spPr>
+          <a:xfrm>
+            <a:off x="0" y="180180"/>
+            <a:ext cx="12192000" cy="6497640"/>
+          </a:xfrm>
+          <a:prstGeom prst="rect">
+            <a:avLst/>
+          </a:prstGeom>
+        </p:spPr>
+      </p:pic>
+      <p:sp>
+        <p:nvSpPr>
+          <p:cNvPr id="5" name="TextovéPole 4">
+            <a:extLst>
+              <a:ext uri="{FF2B5EF4-FFF2-40B4-BE49-F238E27FC236}">
+                <a16:creationId xmlns:a16="http://schemas.microsoft.com/office/drawing/2014/main" id="{996C87E9-9AB6-4136-89F5-CEA238D491F7}"/>
+              </a:ext>
+            </a:extLst>
+          </p:cNvPr>
+          <p:cNvSpPr txBox="1"/>
+          <p:nvPr/>
+        </p:nvSpPr>
+        <p:spPr>
+          <a:xfrm>
+            <a:off x="6448011" y="4430118"/>
+            <a:ext cx="5006837" cy="1754326"/>
+          </a:xfrm>
+          <a:prstGeom prst="rect">
+            <a:avLst/>
+          </a:prstGeom>
+        </p:spPr>
+        <p:style>
+          <a:lnRef idx="2">
+            <a:schemeClr val="accent2">
+              <a:shade val="50000"/>
+            </a:schemeClr>
+          </a:lnRef>
+          <a:fillRef idx="1">
+            <a:schemeClr val="accent2"/>
+          </a:fillRef>
+          <a:effectRef idx="0">
+            <a:schemeClr val="accent2"/>
+          </a:effectRef>
+          <a:fontRef idx="minor">
+            <a:schemeClr val="lt1"/>
+          </a:fontRef>
+        </p:style>
+        <p:txBody>
+          <a:bodyPr wrap="square" rtlCol="0">
+            <a:spAutoFit/>
+          </a:bodyPr>
+          <a:lstStyle/>
+          <a:p>
+            <a:r>
+              <a:rPr lang="cs-CZ" dirty="0"/>
+              <a:t>Nejprve budeme chtít do aplikace vypisovat příspěvky z databáze, musíme si tedy připravit příslušný SQL dotaz.</a:t>
+            </a:r>
+          </a:p>
+          <a:p>
+            <a:endParaRPr lang="cs-CZ" dirty="0"/>
+          </a:p>
+          <a:p>
+            <a:r>
+              <a:rPr lang="cs-CZ" dirty="0"/>
+              <a:t>Pokud si nejste jeho tvarem úplně jisti, doporučuji vám jej nejdřív vyzkoušet např. v </a:t>
+            </a:r>
+            <a:r>
+              <a:rPr lang="cs-CZ" dirty="0" err="1"/>
+              <a:t>phpMyAdminu</a:t>
+            </a:r>
+            <a:r>
+              <a:rPr lang="cs-CZ" dirty="0"/>
+              <a:t>.</a:t>
+            </a:r>
+          </a:p>
+        </p:txBody>
+      </p:sp>
+    </p:spTree>
+    <p:extLst>
+      <p:ext uri="{BB962C8B-B14F-4D97-AF65-F5344CB8AC3E}">
+        <p14:creationId xmlns:p14="http://schemas.microsoft.com/office/powerpoint/2010/main" val="2695591069"/>
+      </p:ext>
+    </p:extLst>
+  </p:cSld>
+  <p:clrMapOvr>
+    <a:masterClrMapping/>
+  </p:clrMapOvr>
+</p:sld>
+</file>
+
+<file path=ppt/slides/slide34.xml><?xml version="1.0" encoding="utf-8"?>
+<p:sld xmlns:a="http://schemas.openxmlformats.org/drawingml/2006/main" xmlns:r="http://schemas.openxmlformats.org/officeDocument/2006/relationships" xmlns:p="http://schemas.openxmlformats.org/presentationml/2006/main">
+  <p:cSld>
+    <p:spTree>
+      <p:nvGrpSpPr>
+        <p:cNvPr id="1" name=""/>
+        <p:cNvGrpSpPr/>
+        <p:nvPr/>
+      </p:nvGrpSpPr>
+      <p:grpSpPr>
+        <a:xfrm>
+          <a:off x="0" y="0"/>
+          <a:ext cx="0" cy="0"/>
+          <a:chOff x="0" y="0"/>
+          <a:chExt cx="0" cy="0"/>
+        </a:xfrm>
+      </p:grpSpPr>
+      <p:sp>
+        <p:nvSpPr>
+          <p:cNvPr id="2" name="Nadpis 1">
+            <a:extLst>
+              <a:ext uri="{FF2B5EF4-FFF2-40B4-BE49-F238E27FC236}">
+                <a16:creationId xmlns:a16="http://schemas.microsoft.com/office/drawing/2014/main" id="{47A7F1BE-F4D4-4D5A-B727-7A77C5F3D36E}"/>
+              </a:ext>
+            </a:extLst>
+          </p:cNvPr>
+          <p:cNvSpPr>
+            <a:spLocks noGrp="1"/>
+          </p:cNvSpPr>
+          <p:nvPr>
+            <p:ph type="title"/>
+          </p:nvPr>
+        </p:nvSpPr>
+        <p:spPr/>
+        <p:txBody>
+          <a:bodyPr/>
+          <a:lstStyle/>
+          <a:p>
+            <a:endParaRPr lang="en-US"/>
+          </a:p>
+        </p:txBody>
+      </p:sp>
+      <p:sp>
+        <p:nvSpPr>
+          <p:cNvPr id="3" name="Zástupný obsah 2">
+            <a:extLst>
+              <a:ext uri="{FF2B5EF4-FFF2-40B4-BE49-F238E27FC236}">
+                <a16:creationId xmlns:a16="http://schemas.microsoft.com/office/drawing/2014/main" id="{8D207A05-21F1-4C98-8968-B9526B54BB74}"/>
+              </a:ext>
+            </a:extLst>
+          </p:cNvPr>
+          <p:cNvSpPr>
+            <a:spLocks noGrp="1"/>
+          </p:cNvSpPr>
+          <p:nvPr>
+            <p:ph idx="1"/>
+          </p:nvPr>
+        </p:nvSpPr>
+        <p:spPr/>
+        <p:txBody>
+          <a:bodyPr/>
+          <a:lstStyle/>
+          <a:p>
+            <a:endParaRPr lang="en-US"/>
+          </a:p>
+        </p:txBody>
+      </p:sp>
+      <p:pic>
+        <p:nvPicPr>
+          <p:cNvPr id="6" name="Obrázek 5">
+            <a:extLst>
+              <a:ext uri="{FF2B5EF4-FFF2-40B4-BE49-F238E27FC236}">
+                <a16:creationId xmlns:a16="http://schemas.microsoft.com/office/drawing/2014/main" id="{5ADA9270-6246-4B3F-A90F-C5E5C0185708}"/>
+              </a:ext>
+            </a:extLst>
+          </p:cNvPr>
+          <p:cNvPicPr>
+            <a:picLocks noChangeAspect="1"/>
+          </p:cNvPicPr>
+          <p:nvPr/>
+        </p:nvPicPr>
+        <p:blipFill>
+          <a:blip r:embed="rId2"/>
+          <a:stretch>
+            <a:fillRect/>
+          </a:stretch>
+        </p:blipFill>
+        <p:spPr>
+          <a:xfrm>
+            <a:off x="0" y="180180"/>
+            <a:ext cx="12192000" cy="6497640"/>
+          </a:xfrm>
+          <a:prstGeom prst="rect">
+            <a:avLst/>
+          </a:prstGeom>
+        </p:spPr>
+      </p:pic>
+      <p:sp>
+        <p:nvSpPr>
+          <p:cNvPr id="7" name="TextovéPole 6">
+            <a:extLst>
+              <a:ext uri="{FF2B5EF4-FFF2-40B4-BE49-F238E27FC236}">
+                <a16:creationId xmlns:a16="http://schemas.microsoft.com/office/drawing/2014/main" id="{CED3EFD6-3262-4521-9FB3-E42C492B9110}"/>
+              </a:ext>
+            </a:extLst>
+          </p:cNvPr>
+          <p:cNvSpPr txBox="1"/>
+          <p:nvPr/>
+        </p:nvSpPr>
+        <p:spPr>
+          <a:xfrm>
+            <a:off x="3935897" y="3608483"/>
+            <a:ext cx="7837004" cy="1200329"/>
+          </a:xfrm>
+          <a:prstGeom prst="rect">
+            <a:avLst/>
+          </a:prstGeom>
+        </p:spPr>
+        <p:style>
+          <a:lnRef idx="2">
+            <a:schemeClr val="accent2">
+              <a:shade val="50000"/>
+            </a:schemeClr>
+          </a:lnRef>
+          <a:fillRef idx="1">
+            <a:schemeClr val="accent2"/>
+          </a:fillRef>
+          <a:effectRef idx="0">
+            <a:schemeClr val="accent2"/>
+          </a:effectRef>
+          <a:fontRef idx="minor">
+            <a:schemeClr val="lt1"/>
+          </a:fontRef>
+        </p:style>
+        <p:txBody>
+          <a:bodyPr wrap="square" rtlCol="0">
+            <a:spAutoFit/>
+          </a:bodyPr>
+          <a:lstStyle/>
+          <a:p>
+            <a:r>
+              <a:rPr lang="cs-CZ" dirty="0"/>
+              <a:t>Všechen kód pro výpis příspěvků na nástěnce budeme vkládat do souboru „</a:t>
+            </a:r>
+            <a:r>
+              <a:rPr lang="cs-CZ" dirty="0" err="1"/>
+              <a:t>index.php</a:t>
+            </a:r>
+            <a:r>
+              <a:rPr lang="cs-CZ" dirty="0"/>
+              <a:t>“, konkrétně mezi načtení hlavičky a patičky stránky.</a:t>
+            </a:r>
+          </a:p>
+          <a:p>
+            <a:endParaRPr lang="cs-CZ" dirty="0"/>
+          </a:p>
+          <a:p>
+            <a:r>
+              <a:rPr lang="cs-CZ" dirty="0"/>
+              <a:t>Nejprve zde připravíme </a:t>
+            </a:r>
+            <a:r>
+              <a:rPr lang="cs-CZ" dirty="0" err="1"/>
+              <a:t>prepare</a:t>
+            </a:r>
+            <a:r>
+              <a:rPr lang="cs-CZ" dirty="0"/>
+              <a:t> </a:t>
+            </a:r>
+            <a:r>
+              <a:rPr lang="cs-CZ" dirty="0" err="1"/>
+              <a:t>statement</a:t>
+            </a:r>
+            <a:r>
+              <a:rPr lang="cs-CZ" dirty="0"/>
+              <a:t> pomocí PDO a spustíme jej.</a:t>
+            </a:r>
+          </a:p>
+        </p:txBody>
+      </p:sp>
+    </p:spTree>
+    <p:extLst>
+      <p:ext uri="{BB962C8B-B14F-4D97-AF65-F5344CB8AC3E}">
+        <p14:creationId xmlns:p14="http://schemas.microsoft.com/office/powerpoint/2010/main" val="3748901642"/>
+      </p:ext>
+    </p:extLst>
+  </p:cSld>
+  <p:clrMapOvr>
+    <a:masterClrMapping/>
+  </p:clrMapOvr>
+</p:sld>
+</file>
+
+<file path=ppt/slides/slide35.xml><?xml version="1.0" encoding="utf-8"?>
+<p:sld xmlns:a="http://schemas.openxmlformats.org/drawingml/2006/main" xmlns:r="http://schemas.openxmlformats.org/officeDocument/2006/relationships" xmlns:p="http://schemas.openxmlformats.org/presentationml/2006/main">
+  <p:cSld>
+    <p:spTree>
+      <p:nvGrpSpPr>
+        <p:cNvPr id="1" name=""/>
+        <p:cNvGrpSpPr/>
+        <p:nvPr/>
+      </p:nvGrpSpPr>
+      <p:grpSpPr>
+        <a:xfrm>
+          <a:off x="0" y="0"/>
+          <a:ext cx="0" cy="0"/>
+          <a:chOff x="0" y="0"/>
+          <a:chExt cx="0" cy="0"/>
+        </a:xfrm>
+      </p:grpSpPr>
+      <p:sp>
+        <p:nvSpPr>
+          <p:cNvPr id="2" name="Nadpis 1">
+            <a:extLst>
+              <a:ext uri="{FF2B5EF4-FFF2-40B4-BE49-F238E27FC236}">
+                <a16:creationId xmlns:a16="http://schemas.microsoft.com/office/drawing/2014/main" id="{13103473-6D81-47F4-BAB0-3E5A888C6B51}"/>
+              </a:ext>
+            </a:extLst>
+          </p:cNvPr>
+          <p:cNvSpPr>
+            <a:spLocks noGrp="1"/>
+          </p:cNvSpPr>
+          <p:nvPr>
+            <p:ph type="title"/>
+          </p:nvPr>
+        </p:nvSpPr>
+        <p:spPr/>
+        <p:txBody>
+          <a:bodyPr/>
+          <a:lstStyle/>
+          <a:p>
+            <a:endParaRPr lang="en-US"/>
+          </a:p>
+        </p:txBody>
+      </p:sp>
+      <p:sp>
+        <p:nvSpPr>
+          <p:cNvPr id="3" name="Zástupný obsah 2">
+            <a:extLst>
+              <a:ext uri="{FF2B5EF4-FFF2-40B4-BE49-F238E27FC236}">
+                <a16:creationId xmlns:a16="http://schemas.microsoft.com/office/drawing/2014/main" id="{4F15CFBD-4E5D-4773-B288-56FBB57D25B9}"/>
+              </a:ext>
+            </a:extLst>
+          </p:cNvPr>
+          <p:cNvSpPr>
+            <a:spLocks noGrp="1"/>
+          </p:cNvSpPr>
+          <p:nvPr>
+            <p:ph idx="1"/>
+          </p:nvPr>
+        </p:nvSpPr>
+        <p:spPr/>
+        <p:txBody>
+          <a:bodyPr/>
+          <a:lstStyle/>
+          <a:p>
+            <a:endParaRPr lang="en-US"/>
+          </a:p>
+        </p:txBody>
+      </p:sp>
+      <p:pic>
+        <p:nvPicPr>
+          <p:cNvPr id="4" name="Obrázek 3">
+            <a:extLst>
+              <a:ext uri="{FF2B5EF4-FFF2-40B4-BE49-F238E27FC236}">
+                <a16:creationId xmlns:a16="http://schemas.microsoft.com/office/drawing/2014/main" id="{4F0F6F1D-BB8F-42CD-AFEA-E99B371D652E}"/>
+              </a:ext>
+            </a:extLst>
+          </p:cNvPr>
+          <p:cNvPicPr>
+            <a:picLocks noChangeAspect="1"/>
+          </p:cNvPicPr>
+          <p:nvPr/>
+        </p:nvPicPr>
+        <p:blipFill>
+          <a:blip r:embed="rId2"/>
+          <a:stretch>
+            <a:fillRect/>
+          </a:stretch>
+        </p:blipFill>
+        <p:spPr>
+          <a:xfrm>
+            <a:off x="0" y="180180"/>
+            <a:ext cx="12192000" cy="6497640"/>
+          </a:xfrm>
+          <a:prstGeom prst="rect">
+            <a:avLst/>
+          </a:prstGeom>
+        </p:spPr>
+      </p:pic>
+      <p:sp>
+        <p:nvSpPr>
+          <p:cNvPr id="5" name="TextovéPole 4">
+            <a:extLst>
+              <a:ext uri="{FF2B5EF4-FFF2-40B4-BE49-F238E27FC236}">
+                <a16:creationId xmlns:a16="http://schemas.microsoft.com/office/drawing/2014/main" id="{BEC391A4-476A-4BF6-AEE5-4FBE9A12AD4A}"/>
+              </a:ext>
+            </a:extLst>
+          </p:cNvPr>
+          <p:cNvSpPr txBox="1"/>
+          <p:nvPr/>
+        </p:nvSpPr>
+        <p:spPr>
+          <a:xfrm>
+            <a:off x="3943350" y="2959127"/>
+            <a:ext cx="5006837" cy="1477328"/>
+          </a:xfrm>
+          <a:prstGeom prst="rect">
+            <a:avLst/>
+          </a:prstGeom>
+        </p:spPr>
+        <p:style>
+          <a:lnRef idx="2">
+            <a:schemeClr val="accent2">
+              <a:shade val="50000"/>
+            </a:schemeClr>
+          </a:lnRef>
+          <a:fillRef idx="1">
+            <a:schemeClr val="accent2"/>
+          </a:fillRef>
+          <a:effectRef idx="0">
+            <a:schemeClr val="accent2"/>
+          </a:effectRef>
+          <a:fontRef idx="minor">
+            <a:schemeClr val="lt1"/>
+          </a:fontRef>
+        </p:style>
+        <p:txBody>
+          <a:bodyPr wrap="square" rtlCol="0">
+            <a:spAutoFit/>
+          </a:bodyPr>
+          <a:lstStyle/>
+          <a:p>
+            <a:r>
+              <a:rPr lang="cs-CZ" dirty="0"/>
+              <a:t>Následně načteme najednou </a:t>
+            </a:r>
+            <a:r>
+              <a:rPr lang="cs-CZ" dirty="0" err="1"/>
+              <a:t>všechn</a:t>
+            </a:r>
+            <a:r>
+              <a:rPr lang="cs-CZ" dirty="0"/>
+              <a:t> výsledky dotazu do proměnné </a:t>
+            </a:r>
+            <a:r>
+              <a:rPr lang="en-US" dirty="0"/>
+              <a:t>$posts.</a:t>
+            </a:r>
+            <a:endParaRPr lang="cs-CZ" dirty="0"/>
+          </a:p>
+          <a:p>
+            <a:endParaRPr lang="cs-CZ" dirty="0"/>
+          </a:p>
+          <a:p>
+            <a:r>
+              <a:rPr lang="cs-CZ" dirty="0"/>
+              <a:t>Parametr v metodě </a:t>
+            </a:r>
+            <a:r>
+              <a:rPr lang="cs-CZ" dirty="0" err="1"/>
+              <a:t>fetchAll</a:t>
+            </a:r>
+            <a:r>
+              <a:rPr lang="cs-CZ" dirty="0"/>
+              <a:t> říká, že chceme výsledky v podobě asociačních polí.</a:t>
+            </a:r>
+          </a:p>
+        </p:txBody>
+      </p:sp>
+    </p:spTree>
+    <p:extLst>
+      <p:ext uri="{BB962C8B-B14F-4D97-AF65-F5344CB8AC3E}">
+        <p14:creationId xmlns:p14="http://schemas.microsoft.com/office/powerpoint/2010/main" val="1345464390"/>
+      </p:ext>
+    </p:extLst>
+  </p:cSld>
+  <p:clrMapOvr>
+    <a:masterClrMapping/>
+  </p:clrMapOvr>
+</p:sld>
+</file>
+
+<file path=ppt/slides/slide36.xml><?xml version="1.0" encoding="utf-8"?>
+<p:sld xmlns:a="http://schemas.openxmlformats.org/drawingml/2006/main" xmlns:r="http://schemas.openxmlformats.org/officeDocument/2006/relationships" xmlns:p="http://schemas.openxmlformats.org/presentationml/2006/main">
+  <p:cSld>
+    <p:spTree>
+      <p:nvGrpSpPr>
+        <p:cNvPr id="1" name=""/>
+        <p:cNvGrpSpPr/>
+        <p:nvPr/>
+      </p:nvGrpSpPr>
+      <p:grpSpPr>
+        <a:xfrm>
+          <a:off x="0" y="0"/>
+          <a:ext cx="0" cy="0"/>
+          <a:chOff x="0" y="0"/>
+          <a:chExt cx="0" cy="0"/>
+        </a:xfrm>
+      </p:grpSpPr>
+      <p:sp>
+        <p:nvSpPr>
+          <p:cNvPr id="2" name="Nadpis 1">
+            <a:extLst>
+              <a:ext uri="{FF2B5EF4-FFF2-40B4-BE49-F238E27FC236}">
+                <a16:creationId xmlns:a16="http://schemas.microsoft.com/office/drawing/2014/main" id="{27D6F3CF-D3B7-468A-BA7E-8808E323771F}"/>
+              </a:ext>
+            </a:extLst>
+          </p:cNvPr>
+          <p:cNvSpPr>
+            <a:spLocks noGrp="1"/>
+          </p:cNvSpPr>
+          <p:nvPr>
+            <p:ph type="title"/>
+          </p:nvPr>
+        </p:nvSpPr>
+        <p:spPr/>
+        <p:txBody>
+          <a:bodyPr/>
+          <a:lstStyle/>
+          <a:p>
+            <a:endParaRPr lang="en-US"/>
+          </a:p>
+        </p:txBody>
+      </p:sp>
+      <p:sp>
+        <p:nvSpPr>
+          <p:cNvPr id="3" name="Zástupný obsah 2">
+            <a:extLst>
+              <a:ext uri="{FF2B5EF4-FFF2-40B4-BE49-F238E27FC236}">
+                <a16:creationId xmlns:a16="http://schemas.microsoft.com/office/drawing/2014/main" id="{F1711677-16A6-4B64-9796-EC02391665B6}"/>
+              </a:ext>
+            </a:extLst>
+          </p:cNvPr>
+          <p:cNvSpPr>
+            <a:spLocks noGrp="1"/>
+          </p:cNvSpPr>
+          <p:nvPr>
+            <p:ph idx="1"/>
+          </p:nvPr>
+        </p:nvSpPr>
+        <p:spPr/>
+        <p:txBody>
+          <a:bodyPr/>
+          <a:lstStyle/>
+          <a:p>
+            <a:endParaRPr lang="en-US"/>
+          </a:p>
+        </p:txBody>
+      </p:sp>
+      <p:pic>
+        <p:nvPicPr>
+          <p:cNvPr id="4" name="Obrázek 3">
+            <a:extLst>
+              <a:ext uri="{FF2B5EF4-FFF2-40B4-BE49-F238E27FC236}">
+                <a16:creationId xmlns:a16="http://schemas.microsoft.com/office/drawing/2014/main" id="{C1F9C251-4F77-4670-95FB-E0770E2FC414}"/>
+              </a:ext>
+            </a:extLst>
+          </p:cNvPr>
+          <p:cNvPicPr>
+            <a:picLocks noChangeAspect="1"/>
+          </p:cNvPicPr>
+          <p:nvPr/>
+        </p:nvPicPr>
+        <p:blipFill>
+          <a:blip r:embed="rId2"/>
+          <a:stretch>
+            <a:fillRect/>
+          </a:stretch>
+        </p:blipFill>
+        <p:spPr>
+          <a:xfrm>
+            <a:off x="0" y="180180"/>
+            <a:ext cx="12192000" cy="6497640"/>
+          </a:xfrm>
+          <a:prstGeom prst="rect">
+            <a:avLst/>
+          </a:prstGeom>
+        </p:spPr>
+      </p:pic>
+      <p:sp>
+        <p:nvSpPr>
+          <p:cNvPr id="5" name="TextovéPole 4">
+            <a:extLst>
+              <a:ext uri="{FF2B5EF4-FFF2-40B4-BE49-F238E27FC236}">
+                <a16:creationId xmlns:a16="http://schemas.microsoft.com/office/drawing/2014/main" id="{642C066C-16A9-43FD-8B61-3DC510BB10AB}"/>
+              </a:ext>
+            </a:extLst>
+          </p:cNvPr>
+          <p:cNvSpPr txBox="1"/>
+          <p:nvPr/>
+        </p:nvSpPr>
+        <p:spPr>
+          <a:xfrm>
+            <a:off x="5433391" y="4430118"/>
+            <a:ext cx="6021457" cy="923330"/>
+          </a:xfrm>
+          <a:prstGeom prst="rect">
+            <a:avLst/>
+          </a:prstGeom>
+        </p:spPr>
+        <p:style>
+          <a:lnRef idx="2">
+            <a:schemeClr val="accent2">
+              <a:shade val="50000"/>
+            </a:schemeClr>
+          </a:lnRef>
+          <a:fillRef idx="1">
+            <a:schemeClr val="accent2"/>
+          </a:fillRef>
+          <a:effectRef idx="0">
+            <a:schemeClr val="accent2"/>
+          </a:effectRef>
+          <a:fontRef idx="minor">
+            <a:schemeClr val="lt1"/>
+          </a:fontRef>
+        </p:style>
+        <p:txBody>
+          <a:bodyPr wrap="square" rtlCol="0">
+            <a:spAutoFit/>
+          </a:bodyPr>
+          <a:lstStyle/>
+          <a:p>
+            <a:r>
+              <a:rPr lang="cs-CZ" dirty="0"/>
+              <a:t>Zjistíme, jestli jsme získali nějaké příspěvky.</a:t>
+            </a:r>
+          </a:p>
+          <a:p>
+            <a:r>
+              <a:rPr lang="cs-CZ" dirty="0"/>
+              <a:t>Pokud ne, vypíšeme uživateli varování, že na nástěnce nic není (aby neměl dojem, že jen došlo k nějaké chybě v načítání).</a:t>
+            </a:r>
+          </a:p>
+        </p:txBody>
+      </p:sp>
+    </p:spTree>
+    <p:extLst>
+      <p:ext uri="{BB962C8B-B14F-4D97-AF65-F5344CB8AC3E}">
+        <p14:creationId xmlns:p14="http://schemas.microsoft.com/office/powerpoint/2010/main" val="6662682"/>
+      </p:ext>
+    </p:extLst>
+  </p:cSld>
+  <p:clrMapOvr>
+    <a:masterClrMapping/>
+  </p:clrMapOvr>
+</p:sld>
+</file>
+
+<file path=ppt/slides/slide37.xml><?xml version="1.0" encoding="utf-8"?>
+<p:sld xmlns:a="http://schemas.openxmlformats.org/drawingml/2006/main" xmlns:r="http://schemas.openxmlformats.org/officeDocument/2006/relationships" xmlns:p="http://schemas.openxmlformats.org/presentationml/2006/main">
+  <p:cSld>
+    <p:spTree>
+      <p:nvGrpSpPr>
+        <p:cNvPr id="1" name=""/>
+        <p:cNvGrpSpPr/>
+        <p:nvPr/>
+      </p:nvGrpSpPr>
+      <p:grpSpPr>
+        <a:xfrm>
+          <a:off x="0" y="0"/>
+          <a:ext cx="0" cy="0"/>
+          <a:chOff x="0" y="0"/>
+          <a:chExt cx="0" cy="0"/>
+        </a:xfrm>
+      </p:grpSpPr>
+      <p:sp>
+        <p:nvSpPr>
+          <p:cNvPr id="2" name="Nadpis 1">
+            <a:extLst>
+              <a:ext uri="{FF2B5EF4-FFF2-40B4-BE49-F238E27FC236}">
+                <a16:creationId xmlns:a16="http://schemas.microsoft.com/office/drawing/2014/main" id="{1F27F4CF-DB1C-4152-B1F6-18AF5DA30A97}"/>
+              </a:ext>
+            </a:extLst>
+          </p:cNvPr>
+          <p:cNvSpPr>
+            <a:spLocks noGrp="1"/>
+          </p:cNvSpPr>
+          <p:nvPr>
+            <p:ph type="title"/>
+          </p:nvPr>
+        </p:nvSpPr>
+        <p:spPr/>
+        <p:txBody>
+          <a:bodyPr/>
+          <a:lstStyle/>
+          <a:p>
+            <a:endParaRPr lang="en-US"/>
+          </a:p>
+        </p:txBody>
+      </p:sp>
+      <p:sp>
+        <p:nvSpPr>
+          <p:cNvPr id="3" name="Zástupný obsah 2">
+            <a:extLst>
+              <a:ext uri="{FF2B5EF4-FFF2-40B4-BE49-F238E27FC236}">
+                <a16:creationId xmlns:a16="http://schemas.microsoft.com/office/drawing/2014/main" id="{AB7D694F-5AB8-406C-A4F5-5A57B4001B8C}"/>
+              </a:ext>
+            </a:extLst>
+          </p:cNvPr>
+          <p:cNvSpPr>
+            <a:spLocks noGrp="1"/>
+          </p:cNvSpPr>
+          <p:nvPr>
+            <p:ph idx="1"/>
+          </p:nvPr>
+        </p:nvSpPr>
+        <p:spPr/>
+        <p:txBody>
+          <a:bodyPr/>
+          <a:lstStyle/>
+          <a:p>
+            <a:endParaRPr lang="en-US"/>
+          </a:p>
+        </p:txBody>
+      </p:sp>
+      <p:pic>
+        <p:nvPicPr>
+          <p:cNvPr id="4" name="Obrázek 3">
+            <a:extLst>
+              <a:ext uri="{FF2B5EF4-FFF2-40B4-BE49-F238E27FC236}">
+                <a16:creationId xmlns:a16="http://schemas.microsoft.com/office/drawing/2014/main" id="{A86AC8E3-1B28-4592-B78C-3086E913464C}"/>
+              </a:ext>
+            </a:extLst>
+          </p:cNvPr>
+          <p:cNvPicPr>
+            <a:picLocks noChangeAspect="1"/>
+          </p:cNvPicPr>
+          <p:nvPr/>
+        </p:nvPicPr>
+        <p:blipFill>
+          <a:blip r:embed="rId2"/>
+          <a:stretch>
+            <a:fillRect/>
+          </a:stretch>
+        </p:blipFill>
+        <p:spPr>
+          <a:xfrm>
+            <a:off x="0" y="180180"/>
+            <a:ext cx="12192000" cy="6497640"/>
+          </a:xfrm>
+          <a:prstGeom prst="rect">
+            <a:avLst/>
+          </a:prstGeom>
+        </p:spPr>
+      </p:pic>
+      <p:sp>
+        <p:nvSpPr>
+          <p:cNvPr id="5" name="TextovéPole 4">
+            <a:extLst>
+              <a:ext uri="{FF2B5EF4-FFF2-40B4-BE49-F238E27FC236}">
+                <a16:creationId xmlns:a16="http://schemas.microsoft.com/office/drawing/2014/main" id="{E2DE48BF-DF97-48C2-9A49-EB92854CEB58}"/>
+              </a:ext>
+            </a:extLst>
+          </p:cNvPr>
+          <p:cNvSpPr txBox="1"/>
+          <p:nvPr/>
+        </p:nvSpPr>
+        <p:spPr>
+          <a:xfrm>
+            <a:off x="4142133" y="3480641"/>
+            <a:ext cx="6592128" cy="1200329"/>
+          </a:xfrm>
+          <a:prstGeom prst="rect">
+            <a:avLst/>
+          </a:prstGeom>
+        </p:spPr>
+        <p:style>
+          <a:lnRef idx="2">
+            <a:schemeClr val="accent2">
+              <a:shade val="50000"/>
+            </a:schemeClr>
+          </a:lnRef>
+          <a:fillRef idx="1">
+            <a:schemeClr val="accent2"/>
+          </a:fillRef>
+          <a:effectRef idx="0">
+            <a:schemeClr val="accent2"/>
+          </a:effectRef>
+          <a:fontRef idx="minor">
+            <a:schemeClr val="lt1"/>
+          </a:fontRef>
+        </p:style>
+        <p:txBody>
+          <a:bodyPr wrap="square" rtlCol="0">
+            <a:spAutoFit/>
+          </a:bodyPr>
+          <a:lstStyle/>
+          <a:p>
+            <a:r>
+              <a:rPr lang="cs-CZ" dirty="0"/>
+              <a:t>V </a:t>
+            </a:r>
+            <a:r>
+              <a:rPr lang="cs-CZ" dirty="0" err="1"/>
+              <a:t>bootstrapu</a:t>
+            </a:r>
+            <a:r>
+              <a:rPr lang="cs-CZ" dirty="0"/>
+              <a:t> vytvoříme pro příspěvky nový řádek a v něm projdeme výsledky z databáze pomocí cyklu </a:t>
+            </a:r>
+            <a:r>
+              <a:rPr lang="cs-CZ" dirty="0" err="1"/>
+              <a:t>foreach</a:t>
+            </a:r>
+            <a:r>
+              <a:rPr lang="cs-CZ" dirty="0"/>
+              <a:t>.</a:t>
+            </a:r>
+          </a:p>
+          <a:p>
+            <a:endParaRPr lang="cs-CZ" dirty="0"/>
+          </a:p>
+          <a:p>
+            <a:r>
+              <a:rPr lang="cs-CZ" dirty="0"/>
+              <a:t>(Pro možnost sbalení kódu to máme označené komentářem region.)</a:t>
+            </a:r>
+          </a:p>
+        </p:txBody>
+      </p:sp>
+    </p:spTree>
+    <p:extLst>
+      <p:ext uri="{BB962C8B-B14F-4D97-AF65-F5344CB8AC3E}">
+        <p14:creationId xmlns:p14="http://schemas.microsoft.com/office/powerpoint/2010/main" val="1279723499"/>
+      </p:ext>
+    </p:extLst>
+  </p:cSld>
+  <p:clrMapOvr>
+    <a:masterClrMapping/>
+  </p:clrMapOvr>
+</p:sld>
+</file>
+
+<file path=ppt/slides/slide38.xml><?xml version="1.0" encoding="utf-8"?>
+<p:sld xmlns:a="http://schemas.openxmlformats.org/drawingml/2006/main" xmlns:r="http://schemas.openxmlformats.org/officeDocument/2006/relationships" xmlns:p="http://schemas.openxmlformats.org/presentationml/2006/main">
+  <p:cSld>
+    <p:spTree>
+      <p:nvGrpSpPr>
+        <p:cNvPr id="1" name=""/>
+        <p:cNvGrpSpPr/>
+        <p:nvPr/>
+      </p:nvGrpSpPr>
+      <p:grpSpPr>
+        <a:xfrm>
+          <a:off x="0" y="0"/>
+          <a:ext cx="0" cy="0"/>
+          <a:chOff x="0" y="0"/>
+          <a:chExt cx="0" cy="0"/>
+        </a:xfrm>
+      </p:grpSpPr>
+      <p:sp>
+        <p:nvSpPr>
+          <p:cNvPr id="2" name="Nadpis 1">
+            <a:extLst>
+              <a:ext uri="{FF2B5EF4-FFF2-40B4-BE49-F238E27FC236}">
+                <a16:creationId xmlns:a16="http://schemas.microsoft.com/office/drawing/2014/main" id="{B8094F28-1F46-4A77-A858-8DD571FA0332}"/>
+              </a:ext>
+            </a:extLst>
+          </p:cNvPr>
+          <p:cNvSpPr>
+            <a:spLocks noGrp="1"/>
+          </p:cNvSpPr>
+          <p:nvPr>
+            <p:ph type="title"/>
+          </p:nvPr>
+        </p:nvSpPr>
+        <p:spPr/>
+        <p:txBody>
+          <a:bodyPr/>
+          <a:lstStyle/>
+          <a:p>
+            <a:endParaRPr lang="en-US"/>
+          </a:p>
+        </p:txBody>
+      </p:sp>
+      <p:sp>
+        <p:nvSpPr>
+          <p:cNvPr id="3" name="Zástupný obsah 2">
+            <a:extLst>
+              <a:ext uri="{FF2B5EF4-FFF2-40B4-BE49-F238E27FC236}">
+                <a16:creationId xmlns:a16="http://schemas.microsoft.com/office/drawing/2014/main" id="{52581A2C-A335-42AA-AEEC-60ADE1D463B5}"/>
+              </a:ext>
+            </a:extLst>
+          </p:cNvPr>
+          <p:cNvSpPr>
+            <a:spLocks noGrp="1"/>
+          </p:cNvSpPr>
+          <p:nvPr>
+            <p:ph idx="1"/>
+          </p:nvPr>
+        </p:nvSpPr>
+        <p:spPr/>
+        <p:txBody>
+          <a:bodyPr/>
+          <a:lstStyle/>
+          <a:p>
+            <a:endParaRPr lang="en-US"/>
+          </a:p>
+        </p:txBody>
+      </p:sp>
+      <p:pic>
+        <p:nvPicPr>
+          <p:cNvPr id="5" name="Obrázek 4">
+            <a:extLst>
+              <a:ext uri="{FF2B5EF4-FFF2-40B4-BE49-F238E27FC236}">
+                <a16:creationId xmlns:a16="http://schemas.microsoft.com/office/drawing/2014/main" id="{245DAB0A-9BD9-43DF-A947-18FF0D07BB1D}"/>
+              </a:ext>
+            </a:extLst>
+          </p:cNvPr>
+          <p:cNvPicPr>
+            <a:picLocks noChangeAspect="1"/>
+          </p:cNvPicPr>
+          <p:nvPr/>
+        </p:nvPicPr>
+        <p:blipFill>
+          <a:blip r:embed="rId2"/>
+          <a:stretch>
+            <a:fillRect/>
+          </a:stretch>
+        </p:blipFill>
+        <p:spPr>
+          <a:xfrm>
+            <a:off x="0" y="180180"/>
+            <a:ext cx="12192000" cy="6497640"/>
+          </a:xfrm>
+          <a:prstGeom prst="rect">
+            <a:avLst/>
+          </a:prstGeom>
+        </p:spPr>
+      </p:pic>
+      <p:sp>
+        <p:nvSpPr>
+          <p:cNvPr id="6" name="TextovéPole 5">
+            <a:extLst>
+              <a:ext uri="{FF2B5EF4-FFF2-40B4-BE49-F238E27FC236}">
+                <a16:creationId xmlns:a16="http://schemas.microsoft.com/office/drawing/2014/main" id="{4FB1AE3D-2038-4269-83F7-93F384D1AA10}"/>
+              </a:ext>
+            </a:extLst>
+          </p:cNvPr>
+          <p:cNvSpPr txBox="1"/>
+          <p:nvPr/>
+        </p:nvSpPr>
+        <p:spPr>
+          <a:xfrm>
+            <a:off x="5970933" y="4296760"/>
+            <a:ext cx="5571711" cy="1754326"/>
+          </a:xfrm>
+          <a:prstGeom prst="rect">
+            <a:avLst/>
+          </a:prstGeom>
+        </p:spPr>
+        <p:style>
+          <a:lnRef idx="2">
+            <a:schemeClr val="accent2">
+              <a:shade val="50000"/>
+            </a:schemeClr>
+          </a:lnRef>
+          <a:fillRef idx="1">
+            <a:schemeClr val="accent2"/>
+          </a:fillRef>
+          <a:effectRef idx="0">
+            <a:schemeClr val="accent2"/>
+          </a:effectRef>
+          <a:fontRef idx="minor">
+            <a:schemeClr val="lt1"/>
+          </a:fontRef>
+        </p:style>
+        <p:txBody>
+          <a:bodyPr wrap="square" rtlCol="0">
+            <a:spAutoFit/>
+          </a:bodyPr>
+          <a:lstStyle/>
+          <a:p>
+            <a:r>
+              <a:rPr lang="cs-CZ" dirty="0"/>
+              <a:t>Každý příspěvek budeme vypisovat do značky </a:t>
+            </a:r>
+            <a:r>
+              <a:rPr lang="cs-CZ" dirty="0" err="1"/>
+              <a:t>article</a:t>
+            </a:r>
+            <a:r>
+              <a:rPr lang="cs-CZ" dirty="0"/>
+              <a:t>.</a:t>
+            </a:r>
+          </a:p>
+          <a:p>
+            <a:endParaRPr lang="cs-CZ" dirty="0"/>
+          </a:p>
+          <a:p>
+            <a:r>
+              <a:rPr lang="cs-CZ" dirty="0"/>
+              <a:t>Neděste se toho množství tříd, jde jen o určení vzhledu pomocí </a:t>
+            </a:r>
+            <a:r>
+              <a:rPr lang="cs-CZ" dirty="0" err="1"/>
+              <a:t>bootstrapu</a:t>
+            </a:r>
+            <a:r>
+              <a:rPr lang="cs-CZ" dirty="0"/>
+              <a:t>. Pokud s ním nekamarádíte, určitě by tu mohla být třeba jen jedna třída, pro kterou byste specifikovali vlastní CSS.</a:t>
+            </a:r>
+          </a:p>
+        </p:txBody>
+      </p:sp>
+    </p:spTree>
+    <p:extLst>
+      <p:ext uri="{BB962C8B-B14F-4D97-AF65-F5344CB8AC3E}">
+        <p14:creationId xmlns:p14="http://schemas.microsoft.com/office/powerpoint/2010/main" val="1319125565"/>
+      </p:ext>
+    </p:extLst>
+  </p:cSld>
+  <p:clrMapOvr>
+    <a:masterClrMapping/>
+  </p:clrMapOvr>
+</p:sld>
+</file>
+
+<file path=ppt/slides/slide39.xml><?xml version="1.0" encoding="utf-8"?>
+<p:sld xmlns:a="http://schemas.openxmlformats.org/drawingml/2006/main" xmlns:r="http://schemas.openxmlformats.org/officeDocument/2006/relationships" xmlns:p="http://schemas.openxmlformats.org/presentationml/2006/main">
+  <p:cSld>
+    <p:spTree>
+      <p:nvGrpSpPr>
+        <p:cNvPr id="1" name=""/>
+        <p:cNvGrpSpPr/>
+        <p:nvPr/>
+      </p:nvGrpSpPr>
+      <p:grpSpPr>
+        <a:xfrm>
+          <a:off x="0" y="0"/>
+          <a:ext cx="0" cy="0"/>
+          <a:chOff x="0" y="0"/>
+          <a:chExt cx="0" cy="0"/>
+        </a:xfrm>
+      </p:grpSpPr>
+      <p:sp>
+        <p:nvSpPr>
+          <p:cNvPr id="2" name="Nadpis 1">
+            <a:extLst>
+              <a:ext uri="{FF2B5EF4-FFF2-40B4-BE49-F238E27FC236}">
+                <a16:creationId xmlns:a16="http://schemas.microsoft.com/office/drawing/2014/main" id="{8F1311F2-AC4B-4337-BCA5-9F35E40044AF}"/>
+              </a:ext>
+            </a:extLst>
+          </p:cNvPr>
+          <p:cNvSpPr>
+            <a:spLocks noGrp="1"/>
+          </p:cNvSpPr>
+          <p:nvPr>
+            <p:ph type="title"/>
+          </p:nvPr>
+        </p:nvSpPr>
+        <p:spPr/>
+        <p:txBody>
+          <a:bodyPr/>
+          <a:lstStyle/>
+          <a:p>
+            <a:endParaRPr lang="en-US"/>
+          </a:p>
+        </p:txBody>
+      </p:sp>
+      <p:sp>
+        <p:nvSpPr>
+          <p:cNvPr id="3" name="Zástupný obsah 2">
+            <a:extLst>
+              <a:ext uri="{FF2B5EF4-FFF2-40B4-BE49-F238E27FC236}">
+                <a16:creationId xmlns:a16="http://schemas.microsoft.com/office/drawing/2014/main" id="{35F2E4FB-9C0E-4A13-B210-31E7D34CB6D7}"/>
+              </a:ext>
+            </a:extLst>
+          </p:cNvPr>
+          <p:cNvSpPr>
+            <a:spLocks noGrp="1"/>
+          </p:cNvSpPr>
+          <p:nvPr>
+            <p:ph idx="1"/>
+          </p:nvPr>
+        </p:nvSpPr>
+        <p:spPr/>
+        <p:txBody>
+          <a:bodyPr/>
+          <a:lstStyle/>
+          <a:p>
+            <a:endParaRPr lang="en-US"/>
+          </a:p>
+        </p:txBody>
+      </p:sp>
+      <p:pic>
+        <p:nvPicPr>
+          <p:cNvPr id="4" name="Obrázek 3">
+            <a:extLst>
+              <a:ext uri="{FF2B5EF4-FFF2-40B4-BE49-F238E27FC236}">
+                <a16:creationId xmlns:a16="http://schemas.microsoft.com/office/drawing/2014/main" id="{36BB991E-53CC-45AB-B22A-3E250453FAD6}"/>
+              </a:ext>
+            </a:extLst>
+          </p:cNvPr>
+          <p:cNvPicPr>
+            <a:picLocks noChangeAspect="1"/>
+          </p:cNvPicPr>
+          <p:nvPr/>
+        </p:nvPicPr>
+        <p:blipFill>
+          <a:blip r:embed="rId2"/>
+          <a:stretch>
+            <a:fillRect/>
+          </a:stretch>
+        </p:blipFill>
+        <p:spPr>
+          <a:xfrm>
+            <a:off x="0" y="180180"/>
+            <a:ext cx="12192000" cy="6497640"/>
+          </a:xfrm>
+          <a:prstGeom prst="rect">
+            <a:avLst/>
+          </a:prstGeom>
+        </p:spPr>
+      </p:pic>
+      <p:sp>
+        <p:nvSpPr>
+          <p:cNvPr id="5" name="TextovéPole 4">
+            <a:extLst>
+              <a:ext uri="{FF2B5EF4-FFF2-40B4-BE49-F238E27FC236}">
+                <a16:creationId xmlns:a16="http://schemas.microsoft.com/office/drawing/2014/main" id="{BCE30D82-7276-4C07-BC98-01272C335B56}"/>
+              </a:ext>
+            </a:extLst>
+          </p:cNvPr>
+          <p:cNvSpPr txBox="1"/>
+          <p:nvPr/>
+        </p:nvSpPr>
+        <p:spPr>
+          <a:xfrm>
+            <a:off x="6448011" y="4430118"/>
+            <a:ext cx="5006837" cy="1754326"/>
+          </a:xfrm>
+          <a:prstGeom prst="rect">
+            <a:avLst/>
+          </a:prstGeom>
+        </p:spPr>
+        <p:style>
+          <a:lnRef idx="2">
+            <a:schemeClr val="accent2">
+              <a:shade val="50000"/>
+            </a:schemeClr>
+          </a:lnRef>
+          <a:fillRef idx="1">
+            <a:schemeClr val="accent2"/>
+          </a:fillRef>
+          <a:effectRef idx="0">
+            <a:schemeClr val="accent2"/>
+          </a:effectRef>
+          <a:fontRef idx="minor">
+            <a:schemeClr val="lt1"/>
+          </a:fontRef>
+        </p:style>
+        <p:txBody>
+          <a:bodyPr wrap="square" rtlCol="0">
+            <a:spAutoFit/>
+          </a:bodyPr>
+          <a:lstStyle/>
+          <a:p>
+            <a:r>
+              <a:rPr lang="cs-CZ" dirty="0"/>
+              <a:t>Jako první vypíšeme do příspěvku označení kategorie.</a:t>
+            </a:r>
+          </a:p>
+          <a:p>
+            <a:endParaRPr lang="cs-CZ" dirty="0"/>
+          </a:p>
+          <a:p>
+            <a:r>
+              <a:rPr lang="cs-CZ" dirty="0"/>
+              <a:t>Upozorňuji na ošetření speciálních znaků pomocí </a:t>
+            </a:r>
+            <a:r>
+              <a:rPr lang="cs-CZ" dirty="0" err="1"/>
+              <a:t>htmlspecialchars</a:t>
+            </a:r>
+            <a:r>
+              <a:rPr lang="en-US" dirty="0"/>
+              <a:t>() </a:t>
+            </a:r>
+            <a:r>
+              <a:rPr lang="cs-CZ" dirty="0"/>
+              <a:t>– protože názvy kategorií může uživatel např. v DB upravit.</a:t>
+            </a:r>
+          </a:p>
+        </p:txBody>
+      </p:sp>
+    </p:spTree>
+    <p:extLst>
+      <p:ext uri="{BB962C8B-B14F-4D97-AF65-F5344CB8AC3E}">
+        <p14:creationId xmlns:p14="http://schemas.microsoft.com/office/powerpoint/2010/main" val="1882692705"/>
       </p:ext>
     </p:extLst>
   </p:cSld>
@@ -6019,6 +9178,753 @@
     <p:extLst>
       <p:ext uri="{BB962C8B-B14F-4D97-AF65-F5344CB8AC3E}">
         <p14:creationId xmlns:p14="http://schemas.microsoft.com/office/powerpoint/2010/main" val="733023931"/>
+      </p:ext>
+    </p:extLst>
+  </p:cSld>
+  <p:clrMapOvr>
+    <a:masterClrMapping/>
+  </p:clrMapOvr>
+</p:sld>
+</file>
+
+<file path=ppt/slides/slide40.xml><?xml version="1.0" encoding="utf-8"?>
+<p:sld xmlns:a="http://schemas.openxmlformats.org/drawingml/2006/main" xmlns:r="http://schemas.openxmlformats.org/officeDocument/2006/relationships" xmlns:p="http://schemas.openxmlformats.org/presentationml/2006/main">
+  <p:cSld>
+    <p:spTree>
+      <p:nvGrpSpPr>
+        <p:cNvPr id="1" name=""/>
+        <p:cNvGrpSpPr/>
+        <p:nvPr/>
+      </p:nvGrpSpPr>
+      <p:grpSpPr>
+        <a:xfrm>
+          <a:off x="0" y="0"/>
+          <a:ext cx="0" cy="0"/>
+          <a:chOff x="0" y="0"/>
+          <a:chExt cx="0" cy="0"/>
+        </a:xfrm>
+      </p:grpSpPr>
+      <p:sp>
+        <p:nvSpPr>
+          <p:cNvPr id="2" name="Nadpis 1">
+            <a:extLst>
+              <a:ext uri="{FF2B5EF4-FFF2-40B4-BE49-F238E27FC236}">
+                <a16:creationId xmlns:a16="http://schemas.microsoft.com/office/drawing/2014/main" id="{786543F8-3575-436C-90D0-A2A1EBDB2FE5}"/>
+              </a:ext>
+            </a:extLst>
+          </p:cNvPr>
+          <p:cNvSpPr>
+            <a:spLocks noGrp="1"/>
+          </p:cNvSpPr>
+          <p:nvPr>
+            <p:ph type="title"/>
+          </p:nvPr>
+        </p:nvSpPr>
+        <p:spPr/>
+        <p:txBody>
+          <a:bodyPr/>
+          <a:lstStyle/>
+          <a:p>
+            <a:endParaRPr lang="en-US"/>
+          </a:p>
+        </p:txBody>
+      </p:sp>
+      <p:sp>
+        <p:nvSpPr>
+          <p:cNvPr id="3" name="Zástupný obsah 2">
+            <a:extLst>
+              <a:ext uri="{FF2B5EF4-FFF2-40B4-BE49-F238E27FC236}">
+                <a16:creationId xmlns:a16="http://schemas.microsoft.com/office/drawing/2014/main" id="{83DB5353-8159-4374-B9F5-B21FBAA7B006}"/>
+              </a:ext>
+            </a:extLst>
+          </p:cNvPr>
+          <p:cNvSpPr>
+            <a:spLocks noGrp="1"/>
+          </p:cNvSpPr>
+          <p:nvPr>
+            <p:ph idx="1"/>
+          </p:nvPr>
+        </p:nvSpPr>
+        <p:spPr/>
+        <p:txBody>
+          <a:bodyPr/>
+          <a:lstStyle/>
+          <a:p>
+            <a:endParaRPr lang="en-US"/>
+          </a:p>
+        </p:txBody>
+      </p:sp>
+      <p:pic>
+        <p:nvPicPr>
+          <p:cNvPr id="4" name="Obrázek 3">
+            <a:extLst>
+              <a:ext uri="{FF2B5EF4-FFF2-40B4-BE49-F238E27FC236}">
+                <a16:creationId xmlns:a16="http://schemas.microsoft.com/office/drawing/2014/main" id="{BF6F1DB3-65F3-4F15-A0B6-CFF5B8A3CFA0}"/>
+              </a:ext>
+            </a:extLst>
+          </p:cNvPr>
+          <p:cNvPicPr>
+            <a:picLocks noChangeAspect="1"/>
+          </p:cNvPicPr>
+          <p:nvPr/>
+        </p:nvPicPr>
+        <p:blipFill>
+          <a:blip r:embed="rId2"/>
+          <a:stretch>
+            <a:fillRect/>
+          </a:stretch>
+        </p:blipFill>
+        <p:spPr>
+          <a:xfrm>
+            <a:off x="0" y="180180"/>
+            <a:ext cx="12192000" cy="6497640"/>
+          </a:xfrm>
+          <a:prstGeom prst="rect">
+            <a:avLst/>
+          </a:prstGeom>
+        </p:spPr>
+      </p:pic>
+      <p:sp>
+        <p:nvSpPr>
+          <p:cNvPr id="5" name="TextovéPole 4">
+            <a:extLst>
+              <a:ext uri="{FF2B5EF4-FFF2-40B4-BE49-F238E27FC236}">
+                <a16:creationId xmlns:a16="http://schemas.microsoft.com/office/drawing/2014/main" id="{E9B798AF-A007-4559-A6E8-FBBB5EF38F44}"/>
+              </a:ext>
+            </a:extLst>
+          </p:cNvPr>
+          <p:cNvSpPr txBox="1"/>
+          <p:nvPr/>
+        </p:nvSpPr>
+        <p:spPr>
+          <a:xfrm>
+            <a:off x="6448011" y="4430118"/>
+            <a:ext cx="5006837" cy="1200329"/>
+          </a:xfrm>
+          <a:prstGeom prst="rect">
+            <a:avLst/>
+          </a:prstGeom>
+        </p:spPr>
+        <p:style>
+          <a:lnRef idx="2">
+            <a:schemeClr val="accent2">
+              <a:shade val="50000"/>
+            </a:schemeClr>
+          </a:lnRef>
+          <a:fillRef idx="1">
+            <a:schemeClr val="accent2"/>
+          </a:fillRef>
+          <a:effectRef idx="0">
+            <a:schemeClr val="accent2"/>
+          </a:effectRef>
+          <a:fontRef idx="minor">
+            <a:schemeClr val="lt1"/>
+          </a:fontRef>
+        </p:style>
+        <p:txBody>
+          <a:bodyPr wrap="square" rtlCol="0">
+            <a:spAutoFit/>
+          </a:bodyPr>
+          <a:lstStyle/>
+          <a:p>
+            <a:r>
+              <a:rPr lang="cs-CZ" dirty="0"/>
+              <a:t>Jako další vypíšeme obsah </a:t>
+            </a:r>
+            <a:r>
+              <a:rPr lang="en-US" dirty="0"/>
+              <a:t>p</a:t>
+            </a:r>
+            <a:r>
+              <a:rPr lang="cs-CZ" dirty="0" err="1"/>
+              <a:t>říspěvku</a:t>
+            </a:r>
+            <a:r>
+              <a:rPr lang="cs-CZ" dirty="0"/>
+              <a:t>.</a:t>
+            </a:r>
+          </a:p>
+          <a:p>
+            <a:r>
+              <a:rPr lang="cs-CZ" dirty="0"/>
+              <a:t>Funkce nl2br předělá zalomení řádků na značky BR. Ještě před tím však nezapomeneme ošetřit speciální znaky.</a:t>
+            </a:r>
+          </a:p>
+        </p:txBody>
+      </p:sp>
+    </p:spTree>
+    <p:extLst>
+      <p:ext uri="{BB962C8B-B14F-4D97-AF65-F5344CB8AC3E}">
+        <p14:creationId xmlns:p14="http://schemas.microsoft.com/office/powerpoint/2010/main" val="737830861"/>
+      </p:ext>
+    </p:extLst>
+  </p:cSld>
+  <p:clrMapOvr>
+    <a:masterClrMapping/>
+  </p:clrMapOvr>
+</p:sld>
+</file>
+
+<file path=ppt/slides/slide41.xml><?xml version="1.0" encoding="utf-8"?>
+<p:sld xmlns:a="http://schemas.openxmlformats.org/drawingml/2006/main" xmlns:r="http://schemas.openxmlformats.org/officeDocument/2006/relationships" xmlns:p="http://schemas.openxmlformats.org/presentationml/2006/main">
+  <p:cSld>
+    <p:spTree>
+      <p:nvGrpSpPr>
+        <p:cNvPr id="1" name=""/>
+        <p:cNvGrpSpPr/>
+        <p:nvPr/>
+      </p:nvGrpSpPr>
+      <p:grpSpPr>
+        <a:xfrm>
+          <a:off x="0" y="0"/>
+          <a:ext cx="0" cy="0"/>
+          <a:chOff x="0" y="0"/>
+          <a:chExt cx="0" cy="0"/>
+        </a:xfrm>
+      </p:grpSpPr>
+      <p:sp>
+        <p:nvSpPr>
+          <p:cNvPr id="2" name="Nadpis 1">
+            <a:extLst>
+              <a:ext uri="{FF2B5EF4-FFF2-40B4-BE49-F238E27FC236}">
+                <a16:creationId xmlns:a16="http://schemas.microsoft.com/office/drawing/2014/main" id="{6DEBD88F-CB0A-4F88-A60D-3486AB70D4CF}"/>
+              </a:ext>
+            </a:extLst>
+          </p:cNvPr>
+          <p:cNvSpPr>
+            <a:spLocks noGrp="1"/>
+          </p:cNvSpPr>
+          <p:nvPr>
+            <p:ph type="title"/>
+          </p:nvPr>
+        </p:nvSpPr>
+        <p:spPr/>
+        <p:txBody>
+          <a:bodyPr/>
+          <a:lstStyle/>
+          <a:p>
+            <a:endParaRPr lang="en-US"/>
+          </a:p>
+        </p:txBody>
+      </p:sp>
+      <p:sp>
+        <p:nvSpPr>
+          <p:cNvPr id="3" name="Zástupný obsah 2">
+            <a:extLst>
+              <a:ext uri="{FF2B5EF4-FFF2-40B4-BE49-F238E27FC236}">
+                <a16:creationId xmlns:a16="http://schemas.microsoft.com/office/drawing/2014/main" id="{64F740BD-2B70-47EE-9704-59DE6142B35A}"/>
+              </a:ext>
+            </a:extLst>
+          </p:cNvPr>
+          <p:cNvSpPr>
+            <a:spLocks noGrp="1"/>
+          </p:cNvSpPr>
+          <p:nvPr>
+            <p:ph idx="1"/>
+          </p:nvPr>
+        </p:nvSpPr>
+        <p:spPr/>
+        <p:txBody>
+          <a:bodyPr/>
+          <a:lstStyle/>
+          <a:p>
+            <a:endParaRPr lang="en-US"/>
+          </a:p>
+        </p:txBody>
+      </p:sp>
+      <p:pic>
+        <p:nvPicPr>
+          <p:cNvPr id="4" name="Obrázek 3">
+            <a:extLst>
+              <a:ext uri="{FF2B5EF4-FFF2-40B4-BE49-F238E27FC236}">
+                <a16:creationId xmlns:a16="http://schemas.microsoft.com/office/drawing/2014/main" id="{2D65BD6A-466A-4524-A467-59092C5F1F73}"/>
+              </a:ext>
+            </a:extLst>
+          </p:cNvPr>
+          <p:cNvPicPr>
+            <a:picLocks noChangeAspect="1"/>
+          </p:cNvPicPr>
+          <p:nvPr/>
+        </p:nvPicPr>
+        <p:blipFill>
+          <a:blip r:embed="rId2"/>
+          <a:stretch>
+            <a:fillRect/>
+          </a:stretch>
+        </p:blipFill>
+        <p:spPr>
+          <a:xfrm>
+            <a:off x="0" y="180180"/>
+            <a:ext cx="12192000" cy="6497640"/>
+          </a:xfrm>
+          <a:prstGeom prst="rect">
+            <a:avLst/>
+          </a:prstGeom>
+        </p:spPr>
+      </p:pic>
+      <p:sp>
+        <p:nvSpPr>
+          <p:cNvPr id="5" name="Rectangle 1">
+            <a:extLst>
+              <a:ext uri="{FF2B5EF4-FFF2-40B4-BE49-F238E27FC236}">
+                <a16:creationId xmlns:a16="http://schemas.microsoft.com/office/drawing/2014/main" id="{50A087A4-BE57-42B5-B9D4-9F047DCF4453}"/>
+              </a:ext>
+            </a:extLst>
+          </p:cNvPr>
+          <p:cNvSpPr>
+            <a:spLocks noChangeArrowheads="1"/>
+          </p:cNvSpPr>
+          <p:nvPr/>
+        </p:nvSpPr>
+        <p:spPr bwMode="auto">
+          <a:xfrm>
+            <a:off x="0" y="0"/>
+            <a:ext cx="12192000" cy="457200"/>
+          </a:xfrm>
+          <a:prstGeom prst="rect">
+            <a:avLst/>
+          </a:prstGeom>
+          <a:solidFill>
+            <a:srgbClr val="FFFFFF"/>
+          </a:solidFill>
+          <a:ln>
+            <a:noFill/>
+          </a:ln>
+          <a:effectLst/>
+          <a:extLst>
+            <a:ext uri="{91240B29-F687-4F45-9708-019B960494DF}">
+              <a14:hiddenLine xmlns:a14="http://schemas.microsoft.com/office/drawing/2010/main" w="9525">
+                <a:solidFill>
+                  <a:schemeClr val="tx1"/>
+                </a:solidFill>
+                <a:miter lim="800000"/>
+                <a:headEnd/>
+                <a:tailEnd/>
+              </a14:hiddenLine>
+            </a:ext>
+            <a:ext uri="{AF507438-7753-43E0-B8FC-AC1667EBCBE1}">
+              <a14:hiddenEffects xmlns:a14="http://schemas.microsoft.com/office/drawing/2010/main">
+                <a:effectLst>
+                  <a:outerShdw dist="35921" dir="2700000" algn="ctr" rotWithShape="0">
+                    <a:schemeClr val="bg2"/>
+                  </a:outerShdw>
+                </a:effectLst>
+              </a14:hiddenEffects>
+            </a:ext>
+          </a:extLst>
+        </p:spPr>
+        <p:txBody>
+          <a:bodyPr vert="horz" wrap="none" lIns="91440" tIns="45720" rIns="91440" bIns="45720" numCol="1" anchor="ctr" anchorCtr="0" compatLnSpc="1">
+            <a:prstTxWarp prst="textNoShape">
+              <a:avLst/>
+            </a:prstTxWarp>
+            <a:spAutoFit/>
+          </a:bodyPr>
+          <a:lstStyle/>
+          <a:p>
+            <a:pPr marL="0" marR="0" lvl="0" indent="0" algn="l" defTabSz="914400" rtl="0" eaLnBrk="0" fontAlgn="base" latinLnBrk="0" hangingPunct="0">
+              <a:lnSpc>
+                <a:spcPct val="100000"/>
+              </a:lnSpc>
+              <a:spcBef>
+                <a:spcPct val="0"/>
+              </a:spcBef>
+              <a:spcAft>
+                <a:spcPct val="0"/>
+              </a:spcAft>
+              <a:buClrTx/>
+              <a:buSzTx/>
+              <a:buFontTx/>
+              <a:buNone/>
+              <a:tabLst/>
+            </a:pPr>
+            <a:r>
+              <a:rPr kumimoji="0" lang="cs-CZ" altLang="cs-CZ" sz="1000" b="1" i="0" u="none" strike="noStrike" cap="none" normalizeH="0" baseline="0">
+                <a:ln>
+                  <a:noFill/>
+                </a:ln>
+                <a:solidFill>
+                  <a:srgbClr val="008000"/>
+                </a:solidFill>
+                <a:effectLst/>
+                <a:latin typeface="Consolas" panose="020B0609020204030204" pitchFamily="49" charset="0"/>
+              </a:rPr>
+              <a:t>&lt;div class="small text-muted mt-1"&gt;</a:t>
+            </a:r>
+            <a:endParaRPr kumimoji="0" lang="cs-CZ" altLang="cs-CZ" sz="1800" b="0" i="0" u="none" strike="noStrike" cap="none" normalizeH="0" baseline="0">
+              <a:ln>
+                <a:noFill/>
+              </a:ln>
+              <a:solidFill>
+                <a:schemeClr val="tx1"/>
+              </a:solidFill>
+              <a:effectLst/>
+              <a:latin typeface="Arial" panose="020B0604020202020204" pitchFamily="34" charset="0"/>
+            </a:endParaRPr>
+          </a:p>
+        </p:txBody>
+      </p:sp>
+      <p:sp>
+        <p:nvSpPr>
+          <p:cNvPr id="6" name="TextovéPole 5">
+            <a:extLst>
+              <a:ext uri="{FF2B5EF4-FFF2-40B4-BE49-F238E27FC236}">
+                <a16:creationId xmlns:a16="http://schemas.microsoft.com/office/drawing/2014/main" id="{6F384D61-C902-4B1E-9849-8FDE2937746A}"/>
+              </a:ext>
+            </a:extLst>
+          </p:cNvPr>
+          <p:cNvSpPr txBox="1"/>
+          <p:nvPr/>
+        </p:nvSpPr>
+        <p:spPr>
+          <a:xfrm>
+            <a:off x="6766063" y="3124131"/>
+            <a:ext cx="5006837" cy="1754326"/>
+          </a:xfrm>
+          <a:prstGeom prst="rect">
+            <a:avLst/>
+          </a:prstGeom>
+        </p:spPr>
+        <p:style>
+          <a:lnRef idx="2">
+            <a:schemeClr val="accent2">
+              <a:shade val="50000"/>
+            </a:schemeClr>
+          </a:lnRef>
+          <a:fillRef idx="1">
+            <a:schemeClr val="accent2"/>
+          </a:fillRef>
+          <a:effectRef idx="0">
+            <a:schemeClr val="accent2"/>
+          </a:effectRef>
+          <a:fontRef idx="minor">
+            <a:schemeClr val="lt1"/>
+          </a:fontRef>
+        </p:style>
+        <p:txBody>
+          <a:bodyPr wrap="square" rtlCol="0">
+            <a:spAutoFit/>
+          </a:bodyPr>
+          <a:lstStyle/>
+          <a:p>
+            <a:r>
+              <a:rPr lang="cs-CZ" dirty="0"/>
+              <a:t>Posledními vypisovanými údaji budou jméno autora a datum a čas vytvoření příspěvku.</a:t>
+            </a:r>
+          </a:p>
+          <a:p>
+            <a:endParaRPr lang="cs-CZ" dirty="0"/>
+          </a:p>
+          <a:p>
+            <a:r>
+              <a:rPr lang="cs-CZ" dirty="0"/>
+              <a:t>Funkce pro datum a čas ještě budeme probírat, zatím je studovat nemusíte. Takhle ale budeme mít datum vypsaný česky </a:t>
+            </a:r>
+            <a:r>
+              <a:rPr lang="cs-CZ" dirty="0">
+                <a:sym typeface="Wingdings" panose="05000000000000000000" pitchFamily="2" charset="2"/>
+              </a:rPr>
+              <a:t></a:t>
+            </a:r>
+            <a:endParaRPr lang="cs-CZ" dirty="0"/>
+          </a:p>
+        </p:txBody>
+      </p:sp>
+    </p:spTree>
+    <p:extLst>
+      <p:ext uri="{BB962C8B-B14F-4D97-AF65-F5344CB8AC3E}">
+        <p14:creationId xmlns:p14="http://schemas.microsoft.com/office/powerpoint/2010/main" val="2158505177"/>
+      </p:ext>
+    </p:extLst>
+  </p:cSld>
+  <p:clrMapOvr>
+    <a:masterClrMapping/>
+  </p:clrMapOvr>
+</p:sld>
+</file>
+
+<file path=ppt/slides/slide42.xml><?xml version="1.0" encoding="utf-8"?>
+<p:sld xmlns:a="http://schemas.openxmlformats.org/drawingml/2006/main" xmlns:r="http://schemas.openxmlformats.org/officeDocument/2006/relationships" xmlns:p="http://schemas.openxmlformats.org/presentationml/2006/main">
+  <p:cSld>
+    <p:spTree>
+      <p:nvGrpSpPr>
+        <p:cNvPr id="1" name=""/>
+        <p:cNvGrpSpPr/>
+        <p:nvPr/>
+      </p:nvGrpSpPr>
+      <p:grpSpPr>
+        <a:xfrm>
+          <a:off x="0" y="0"/>
+          <a:ext cx="0" cy="0"/>
+          <a:chOff x="0" y="0"/>
+          <a:chExt cx="0" cy="0"/>
+        </a:xfrm>
+      </p:grpSpPr>
+      <p:sp>
+        <p:nvSpPr>
+          <p:cNvPr id="2" name="Nadpis 1">
+            <a:extLst>
+              <a:ext uri="{FF2B5EF4-FFF2-40B4-BE49-F238E27FC236}">
+                <a16:creationId xmlns:a16="http://schemas.microsoft.com/office/drawing/2014/main" id="{7015DCD9-4365-4164-94B3-680EC73A244A}"/>
+              </a:ext>
+            </a:extLst>
+          </p:cNvPr>
+          <p:cNvSpPr>
+            <a:spLocks noGrp="1"/>
+          </p:cNvSpPr>
+          <p:nvPr>
+            <p:ph type="title"/>
+          </p:nvPr>
+        </p:nvSpPr>
+        <p:spPr/>
+        <p:txBody>
+          <a:bodyPr/>
+          <a:lstStyle/>
+          <a:p>
+            <a:endParaRPr lang="en-US"/>
+          </a:p>
+        </p:txBody>
+      </p:sp>
+      <p:sp>
+        <p:nvSpPr>
+          <p:cNvPr id="3" name="Zástupný obsah 2">
+            <a:extLst>
+              <a:ext uri="{FF2B5EF4-FFF2-40B4-BE49-F238E27FC236}">
+                <a16:creationId xmlns:a16="http://schemas.microsoft.com/office/drawing/2014/main" id="{283BF935-A19C-4BCB-AC24-840A555A97C3}"/>
+              </a:ext>
+            </a:extLst>
+          </p:cNvPr>
+          <p:cNvSpPr>
+            <a:spLocks noGrp="1"/>
+          </p:cNvSpPr>
+          <p:nvPr>
+            <p:ph idx="1"/>
+          </p:nvPr>
+        </p:nvSpPr>
+        <p:spPr/>
+        <p:txBody>
+          <a:bodyPr/>
+          <a:lstStyle/>
+          <a:p>
+            <a:endParaRPr lang="en-US" dirty="0"/>
+          </a:p>
+        </p:txBody>
+      </p:sp>
+      <p:pic>
+        <p:nvPicPr>
+          <p:cNvPr id="4" name="Obrázek 3">
+            <a:extLst>
+              <a:ext uri="{FF2B5EF4-FFF2-40B4-BE49-F238E27FC236}">
+                <a16:creationId xmlns:a16="http://schemas.microsoft.com/office/drawing/2014/main" id="{7E7E6A16-F0BC-4607-857D-83CED5A1FC99}"/>
+              </a:ext>
+            </a:extLst>
+          </p:cNvPr>
+          <p:cNvPicPr>
+            <a:picLocks noChangeAspect="1"/>
+          </p:cNvPicPr>
+          <p:nvPr/>
+        </p:nvPicPr>
+        <p:blipFill>
+          <a:blip r:embed="rId2"/>
+          <a:stretch>
+            <a:fillRect/>
+          </a:stretch>
+        </p:blipFill>
+        <p:spPr>
+          <a:xfrm>
+            <a:off x="0" y="180180"/>
+            <a:ext cx="12192000" cy="6497640"/>
+          </a:xfrm>
+          <a:prstGeom prst="rect">
+            <a:avLst/>
+          </a:prstGeom>
+        </p:spPr>
+      </p:pic>
+      <p:sp>
+        <p:nvSpPr>
+          <p:cNvPr id="5" name="TextovéPole 4">
+            <a:extLst>
+              <a:ext uri="{FF2B5EF4-FFF2-40B4-BE49-F238E27FC236}">
+                <a16:creationId xmlns:a16="http://schemas.microsoft.com/office/drawing/2014/main" id="{07D888AF-C250-4FE7-B2BA-FCE9CF2E2401}"/>
+              </a:ext>
+            </a:extLst>
+          </p:cNvPr>
+          <p:cNvSpPr txBox="1"/>
+          <p:nvPr/>
+        </p:nvSpPr>
+        <p:spPr>
+          <a:xfrm>
+            <a:off x="6448011" y="4430118"/>
+            <a:ext cx="5006837" cy="1477328"/>
+          </a:xfrm>
+          <a:prstGeom prst="rect">
+            <a:avLst/>
+          </a:prstGeom>
+        </p:spPr>
+        <p:style>
+          <a:lnRef idx="2">
+            <a:schemeClr val="accent2">
+              <a:shade val="50000"/>
+            </a:schemeClr>
+          </a:lnRef>
+          <a:fillRef idx="1">
+            <a:schemeClr val="accent2"/>
+          </a:fillRef>
+          <a:effectRef idx="0">
+            <a:schemeClr val="accent2"/>
+          </a:effectRef>
+          <a:fontRef idx="minor">
+            <a:schemeClr val="lt1"/>
+          </a:fontRef>
+        </p:style>
+        <p:txBody>
+          <a:bodyPr wrap="square" rtlCol="0">
+            <a:spAutoFit/>
+          </a:bodyPr>
+          <a:lstStyle/>
+          <a:p>
+            <a:r>
+              <a:rPr lang="cs-CZ" dirty="0"/>
+              <a:t>A to je z hlediska výpisu příspěvků vše. </a:t>
+            </a:r>
+          </a:p>
+          <a:p>
+            <a:endParaRPr lang="cs-CZ" dirty="0"/>
+          </a:p>
+          <a:p>
+            <a:r>
+              <a:rPr lang="cs-CZ" dirty="0"/>
+              <a:t>Do stránky ještě doplníme odkaz v podobě tlačítka pro přidání nového příspěvku. Odkazujeme na soubor </a:t>
+            </a:r>
+            <a:r>
+              <a:rPr lang="cs-CZ" dirty="0" err="1"/>
+              <a:t>edit.php</a:t>
+            </a:r>
+            <a:r>
+              <a:rPr lang="cs-CZ" dirty="0"/>
+              <a:t>, který si vytvoříme za chvíli.</a:t>
+            </a:r>
+          </a:p>
+        </p:txBody>
+      </p:sp>
+    </p:spTree>
+    <p:extLst>
+      <p:ext uri="{BB962C8B-B14F-4D97-AF65-F5344CB8AC3E}">
+        <p14:creationId xmlns:p14="http://schemas.microsoft.com/office/powerpoint/2010/main" val="3393971701"/>
+      </p:ext>
+    </p:extLst>
+  </p:cSld>
+  <p:clrMapOvr>
+    <a:masterClrMapping/>
+  </p:clrMapOvr>
+</p:sld>
+</file>
+
+<file path=ppt/slides/slide43.xml><?xml version="1.0" encoding="utf-8"?>
+<p:sld xmlns:a="http://schemas.openxmlformats.org/drawingml/2006/main" xmlns:r="http://schemas.openxmlformats.org/officeDocument/2006/relationships" xmlns:p="http://schemas.openxmlformats.org/presentationml/2006/main">
+  <p:cSld>
+    <p:spTree>
+      <p:nvGrpSpPr>
+        <p:cNvPr id="1" name=""/>
+        <p:cNvGrpSpPr/>
+        <p:nvPr/>
+      </p:nvGrpSpPr>
+      <p:grpSpPr>
+        <a:xfrm>
+          <a:off x="0" y="0"/>
+          <a:ext cx="0" cy="0"/>
+          <a:chOff x="0" y="0"/>
+          <a:chExt cx="0" cy="0"/>
+        </a:xfrm>
+      </p:grpSpPr>
+      <p:sp>
+        <p:nvSpPr>
+          <p:cNvPr id="2" name="Nadpis 1">
+            <a:extLst>
+              <a:ext uri="{FF2B5EF4-FFF2-40B4-BE49-F238E27FC236}">
+                <a16:creationId xmlns:a16="http://schemas.microsoft.com/office/drawing/2014/main" id="{BFE23952-B615-434B-8A2D-AF877E8CF255}"/>
+              </a:ext>
+            </a:extLst>
+          </p:cNvPr>
+          <p:cNvSpPr>
+            <a:spLocks noGrp="1"/>
+          </p:cNvSpPr>
+          <p:nvPr>
+            <p:ph type="title"/>
+          </p:nvPr>
+        </p:nvSpPr>
+        <p:spPr/>
+        <p:txBody>
+          <a:bodyPr/>
+          <a:lstStyle/>
+          <a:p>
+            <a:endParaRPr lang="en-US"/>
+          </a:p>
+        </p:txBody>
+      </p:sp>
+      <p:sp>
+        <p:nvSpPr>
+          <p:cNvPr id="3" name="Zástupný obsah 2">
+            <a:extLst>
+              <a:ext uri="{FF2B5EF4-FFF2-40B4-BE49-F238E27FC236}">
+                <a16:creationId xmlns:a16="http://schemas.microsoft.com/office/drawing/2014/main" id="{86908A66-AAA6-4406-84ED-F84061F25CF8}"/>
+              </a:ext>
+            </a:extLst>
+          </p:cNvPr>
+          <p:cNvSpPr>
+            <a:spLocks noGrp="1"/>
+          </p:cNvSpPr>
+          <p:nvPr>
+            <p:ph idx="1"/>
+          </p:nvPr>
+        </p:nvSpPr>
+        <p:spPr/>
+        <p:txBody>
+          <a:bodyPr/>
+          <a:lstStyle/>
+          <a:p>
+            <a:pPr marL="0" indent="0">
+              <a:buNone/>
+            </a:pPr>
+            <a:r>
+              <a:rPr lang="cs-CZ" dirty="0"/>
+              <a:t>Výpis příspěvků máme hotový. Nahrajte kód na server a zkontrolujte, zda se v prohlížeči opravdu zobrazí výpis příspěvků.</a:t>
+            </a:r>
+          </a:p>
+          <a:p>
+            <a:pPr marL="0" indent="0">
+              <a:buNone/>
+            </a:pPr>
+            <a:endParaRPr lang="cs-CZ" dirty="0"/>
+          </a:p>
+          <a:p>
+            <a:pPr marL="0" indent="0">
+              <a:buNone/>
+            </a:pPr>
+            <a:r>
+              <a:rPr lang="cs-CZ" dirty="0"/>
+              <a:t>Jako druhou část aplikace poté vytvoříme soubor </a:t>
+            </a:r>
+            <a:r>
+              <a:rPr lang="cs-CZ" dirty="0" err="1"/>
+              <a:t>edit.php</a:t>
+            </a:r>
+            <a:r>
+              <a:rPr lang="cs-CZ" dirty="0"/>
+              <a:t>, který bude obsahovat formulář pro vytváření </a:t>
+            </a:r>
+            <a:r>
+              <a:rPr lang="cs-CZ"/>
+              <a:t>nových příspěvků.</a:t>
+            </a:r>
+            <a:endParaRPr lang="en-US" dirty="0"/>
+          </a:p>
+        </p:txBody>
+      </p:sp>
+    </p:spTree>
+    <p:extLst>
+      <p:ext uri="{BB962C8B-B14F-4D97-AF65-F5344CB8AC3E}">
+        <p14:creationId xmlns:p14="http://schemas.microsoft.com/office/powerpoint/2010/main" val="2270497747"/>
       </p:ext>
     </p:extLst>
   </p:cSld>

</xml_diff>